<commit_message>
Slides finish JPEG intro
</commit_message>
<xml_diff>
--- a/final.pptx
+++ b/final.pptx
@@ -7,8 +7,13 @@
   <p:sldIdLst>
     <p:sldId id="256" r:id="rId2"/>
     <p:sldId id="257" r:id="rId3"/>
-    <p:sldId id="258" r:id="rId4"/>
-    <p:sldId id="259" r:id="rId5"/>
+    <p:sldId id="260" r:id="rId4"/>
+    <p:sldId id="258" r:id="rId5"/>
+    <p:sldId id="259" r:id="rId6"/>
+    <p:sldId id="261" r:id="rId7"/>
+    <p:sldId id="262" r:id="rId8"/>
+    <p:sldId id="263" r:id="rId9"/>
+    <p:sldId id="264" r:id="rId10"/>
   </p:sldIdLst>
   <p:sldSz cx="12192000" cy="6858000"/>
   <p:notesSz cx="6858000" cy="9144000"/>
@@ -107,6 +112,11 @@
       </a:defRPr>
     </a:lvl9pPr>
   </p:defaultTextStyle>
+  <p:extLst>
+    <p:ext uri="{EFAFB233-063F-42B5-8137-9DF3F51BA10A}">
+      <p15:sldGuideLst xmlns:p15="http://schemas.microsoft.com/office/powerpoint/2012/main"/>
+    </p:ext>
+  </p:extLst>
 </p:presentation>
 </file>
 
@@ -257,7 +267,7 @@
           <a:p>
             <a:fld id="{D26B2EE9-B468-624C-9A44-89696DD26D30}" type="datetimeFigureOut">
               <a:rPr lang="en-US" smtClean="0"/>
-              <a:t>11/27/18</a:t>
+              <a:t>12/8/18</a:t>
             </a:fld>
             <a:endParaRPr lang="en-US"/>
           </a:p>
@@ -455,7 +465,7 @@
           <a:p>
             <a:fld id="{D26B2EE9-B468-624C-9A44-89696DD26D30}" type="datetimeFigureOut">
               <a:rPr lang="en-US" smtClean="0"/>
-              <a:t>11/27/18</a:t>
+              <a:t>12/8/18</a:t>
             </a:fld>
             <a:endParaRPr lang="en-US"/>
           </a:p>
@@ -663,7 +673,7 @@
           <a:p>
             <a:fld id="{D26B2EE9-B468-624C-9A44-89696DD26D30}" type="datetimeFigureOut">
               <a:rPr lang="en-US" smtClean="0"/>
-              <a:t>11/27/18</a:t>
+              <a:t>12/8/18</a:t>
             </a:fld>
             <a:endParaRPr lang="en-US"/>
           </a:p>
@@ -861,7 +871,7 @@
           <a:p>
             <a:fld id="{D26B2EE9-B468-624C-9A44-89696DD26D30}" type="datetimeFigureOut">
               <a:rPr lang="en-US" smtClean="0"/>
-              <a:t>11/27/18</a:t>
+              <a:t>12/8/18</a:t>
             </a:fld>
             <a:endParaRPr lang="en-US"/>
           </a:p>
@@ -1136,7 +1146,7 @@
           <a:p>
             <a:fld id="{D26B2EE9-B468-624C-9A44-89696DD26D30}" type="datetimeFigureOut">
               <a:rPr lang="en-US" smtClean="0"/>
-              <a:t>11/27/18</a:t>
+              <a:t>12/8/18</a:t>
             </a:fld>
             <a:endParaRPr lang="en-US"/>
           </a:p>
@@ -1401,7 +1411,7 @@
           <a:p>
             <a:fld id="{D26B2EE9-B468-624C-9A44-89696DD26D30}" type="datetimeFigureOut">
               <a:rPr lang="en-US" smtClean="0"/>
-              <a:t>11/27/18</a:t>
+              <a:t>12/8/18</a:t>
             </a:fld>
             <a:endParaRPr lang="en-US"/>
           </a:p>
@@ -1813,7 +1823,7 @@
           <a:p>
             <a:fld id="{D26B2EE9-B468-624C-9A44-89696DD26D30}" type="datetimeFigureOut">
               <a:rPr lang="en-US" smtClean="0"/>
-              <a:t>11/27/18</a:t>
+              <a:t>12/8/18</a:t>
             </a:fld>
             <a:endParaRPr lang="en-US"/>
           </a:p>
@@ -1954,7 +1964,7 @@
           <a:p>
             <a:fld id="{D26B2EE9-B468-624C-9A44-89696DD26D30}" type="datetimeFigureOut">
               <a:rPr lang="en-US" smtClean="0"/>
-              <a:t>11/27/18</a:t>
+              <a:t>12/8/18</a:t>
             </a:fld>
             <a:endParaRPr lang="en-US"/>
           </a:p>
@@ -2067,7 +2077,7 @@
           <a:p>
             <a:fld id="{D26B2EE9-B468-624C-9A44-89696DD26D30}" type="datetimeFigureOut">
               <a:rPr lang="en-US" smtClean="0"/>
-              <a:t>11/27/18</a:t>
+              <a:t>12/8/18</a:t>
             </a:fld>
             <a:endParaRPr lang="en-US"/>
           </a:p>
@@ -2378,7 +2388,7 @@
           <a:p>
             <a:fld id="{D26B2EE9-B468-624C-9A44-89696DD26D30}" type="datetimeFigureOut">
               <a:rPr lang="en-US" smtClean="0"/>
-              <a:t>11/27/18</a:t>
+              <a:t>12/8/18</a:t>
             </a:fld>
             <a:endParaRPr lang="en-US"/>
           </a:p>
@@ -2666,7 +2676,7 @@
           <a:p>
             <a:fld id="{D26B2EE9-B468-624C-9A44-89696DD26D30}" type="datetimeFigureOut">
               <a:rPr lang="en-US" smtClean="0"/>
-              <a:t>11/27/18</a:t>
+              <a:t>12/8/18</a:t>
             </a:fld>
             <a:endParaRPr lang="en-US"/>
           </a:p>
@@ -2907,7 +2917,7 @@
           <a:p>
             <a:fld id="{D26B2EE9-B468-624C-9A44-89696DD26D30}" type="datetimeFigureOut">
               <a:rPr lang="en-US" smtClean="0"/>
-              <a:t>11/27/18</a:t>
+              <a:t>12/8/18</a:t>
             </a:fld>
             <a:endParaRPr lang="en-US"/>
           </a:p>
@@ -3512,7 +3522,7 @@
           <p:cNvPr id="2" name="Title 1">
             <a:extLst>
               <a:ext uri="{FF2B5EF4-FFF2-40B4-BE49-F238E27FC236}">
-                <a16:creationId xmlns:a16="http://schemas.microsoft.com/office/drawing/2014/main" id="{802F821B-15AE-834E-A23C-B5C7AD2D9790}"/>
+                <a16:creationId xmlns:a16="http://schemas.microsoft.com/office/drawing/2014/main" id="{866003B9-5835-1548-800C-5877F0435AF8}"/>
               </a:ext>
             </a:extLst>
           </p:cNvPr>
@@ -3530,17 +3540,8 @@
           <a:p>
             <a:r>
               <a:rPr lang="en-US" dirty="0"/>
-              <a:t>Steps</a:t>
-            </a:r>
-            <a:r>
-              <a:rPr lang="zh-TW" altLang="en-US" dirty="0"/>
-              <a:t> </a:t>
-            </a:r>
-            <a:r>
-              <a:rPr lang="en-US" altLang="zh-TW" dirty="0"/>
-              <a:t>of JPEG Encoder</a:t>
-            </a:r>
-            <a:endParaRPr lang="en-US" dirty="0"/>
+              <a:t>JPEG</a:t>
+            </a:r>
           </a:p>
         </p:txBody>
       </p:sp>
@@ -3549,7 +3550,7 @@
           <p:cNvPr id="3" name="Content Placeholder 2">
             <a:extLst>
               <a:ext uri="{FF2B5EF4-FFF2-40B4-BE49-F238E27FC236}">
-                <a16:creationId xmlns:a16="http://schemas.microsoft.com/office/drawing/2014/main" id="{846E6085-7841-874B-931D-81F1B65CA585}"/>
+                <a16:creationId xmlns:a16="http://schemas.microsoft.com/office/drawing/2014/main" id="{39A5B677-C447-C645-927F-537843F78A91}"/>
               </a:ext>
             </a:extLst>
           </p:cNvPr>
@@ -3567,56 +3568,30 @@
           <a:p>
             <a:r>
               <a:rPr lang="en-US" dirty="0"/>
-              <a:t>Color Transformation</a:t>
+              <a:t>Lossy compression for digital image</a:t>
             </a:r>
           </a:p>
           <a:p>
             <a:r>
               <a:rPr lang="en-US" dirty="0"/>
-              <a:t>Down-sampling</a:t>
+              <a:t>Tradeoff between storage and image quality</a:t>
             </a:r>
           </a:p>
           <a:p>
             <a:r>
               <a:rPr lang="en-US" dirty="0"/>
-              <a:t>Block splitting</a:t>
-            </a:r>
-          </a:p>
-          <a:p>
-            <a:r>
-              <a:rPr lang="en-US" dirty="0"/>
-              <a:t>Forward Discrete Cosine </a:t>
-            </a:r>
-            <a:r>
-              <a:rPr lang="en-US" dirty="0" err="1"/>
-              <a:t>Tranform</a:t>
-            </a:r>
+              <a:t>10:1 compression with little perceptible loss in image quality</a:t>
+            </a:r>
+          </a:p>
+          <a:p>
             <a:endParaRPr lang="en-US" dirty="0"/>
-          </a:p>
-          <a:p>
-            <a:r>
-              <a:rPr lang="en-US" dirty="0"/>
-              <a:t>Quantization</a:t>
-            </a:r>
-          </a:p>
-          <a:p>
-            <a:r>
-              <a:rPr lang="en-US" dirty="0"/>
-              <a:t>Entropy Coding</a:t>
-            </a:r>
-          </a:p>
-          <a:p>
-            <a:r>
-              <a:rPr lang="en-US" dirty="0"/>
-              <a:t>JPEG Serialization</a:t>
-            </a:r>
           </a:p>
         </p:txBody>
       </p:sp>
     </p:spTree>
     <p:extLst>
       <p:ext uri="{BB962C8B-B14F-4D97-AF65-F5344CB8AC3E}">
-        <p14:creationId xmlns:p14="http://schemas.microsoft.com/office/powerpoint/2010/main" val="1276074747"/>
+        <p14:creationId xmlns:p14="http://schemas.microsoft.com/office/powerpoint/2010/main" val="429409837"/>
       </p:ext>
     </p:extLst>
   </p:cSld>
@@ -3648,7 +3623,7 @@
           <p:cNvPr id="2" name="Title 1">
             <a:extLst>
               <a:ext uri="{FF2B5EF4-FFF2-40B4-BE49-F238E27FC236}">
-                <a16:creationId xmlns:a16="http://schemas.microsoft.com/office/drawing/2014/main" id="{AF9A391E-92AF-4343-8BCC-0F8DBC76B55A}"/>
+                <a16:creationId xmlns:a16="http://schemas.microsoft.com/office/drawing/2014/main" id="{802F821B-15AE-834E-A23C-B5C7AD2D9790}"/>
               </a:ext>
             </a:extLst>
           </p:cNvPr>
@@ -3664,7 +3639,19 @@
           <a:bodyPr/>
           <a:lstStyle/>
           <a:p>
-            <a:endParaRPr lang="en-US"/>
+            <a:r>
+              <a:rPr lang="en-US" dirty="0"/>
+              <a:t>Steps</a:t>
+            </a:r>
+            <a:r>
+              <a:rPr lang="zh-TW" altLang="en-US" dirty="0"/>
+              <a:t> </a:t>
+            </a:r>
+            <a:r>
+              <a:rPr lang="en-US" altLang="zh-TW" dirty="0"/>
+              <a:t>of JPEG Encoder</a:t>
+            </a:r>
+            <a:endParaRPr lang="en-US" dirty="0"/>
           </a:p>
         </p:txBody>
       </p:sp>
@@ -3673,7 +3660,7 @@
           <p:cNvPr id="3" name="Content Placeholder 2">
             <a:extLst>
               <a:ext uri="{FF2B5EF4-FFF2-40B4-BE49-F238E27FC236}">
-                <a16:creationId xmlns:a16="http://schemas.microsoft.com/office/drawing/2014/main" id="{913F956B-4E3A-254B-BADB-8F154CE5C680}"/>
+                <a16:creationId xmlns:a16="http://schemas.microsoft.com/office/drawing/2014/main" id="{846E6085-7841-874B-931D-81F1B65CA585}"/>
               </a:ext>
             </a:extLst>
           </p:cNvPr>
@@ -3689,7 +3676,249 @@
           <a:bodyPr/>
           <a:lstStyle/>
           <a:p>
-            <a:endParaRPr lang="en-US"/>
+            <a:r>
+              <a:rPr lang="en-US" dirty="0"/>
+              <a:t>Color Transformation</a:t>
+            </a:r>
+          </a:p>
+          <a:p>
+            <a:r>
+              <a:rPr lang="en-US" dirty="0"/>
+              <a:t>Subsampling</a:t>
+            </a:r>
+          </a:p>
+          <a:p>
+            <a:r>
+              <a:rPr lang="en-US" dirty="0"/>
+              <a:t>Block splitting</a:t>
+            </a:r>
+          </a:p>
+          <a:p>
+            <a:r>
+              <a:rPr lang="en-US" dirty="0"/>
+              <a:t>Forward Discrete Cosine Transform</a:t>
+            </a:r>
+          </a:p>
+          <a:p>
+            <a:r>
+              <a:rPr lang="en-US" dirty="0"/>
+              <a:t>Quantization</a:t>
+            </a:r>
+          </a:p>
+          <a:p>
+            <a:r>
+              <a:rPr lang="en-US" dirty="0"/>
+              <a:t>Entropy Coding</a:t>
+            </a:r>
+          </a:p>
+          <a:p>
+            <a:r>
+              <a:rPr lang="en-US" dirty="0"/>
+              <a:t>JPEG Serialization</a:t>
+            </a:r>
+          </a:p>
+        </p:txBody>
+      </p:sp>
+    </p:spTree>
+    <p:extLst>
+      <p:ext uri="{BB962C8B-B14F-4D97-AF65-F5344CB8AC3E}">
+        <p14:creationId xmlns:p14="http://schemas.microsoft.com/office/powerpoint/2010/main" val="1276074747"/>
+      </p:ext>
+    </p:extLst>
+  </p:cSld>
+  <p:clrMapOvr>
+    <a:masterClrMapping/>
+  </p:clrMapOvr>
+</p:sld>
+</file>
+
+<file path=ppt/slides/slide5.xml><?xml version="1.0" encoding="utf-8"?>
+<p:sld xmlns:a="http://schemas.openxmlformats.org/drawingml/2006/main" xmlns:r="http://schemas.openxmlformats.org/officeDocument/2006/relationships" xmlns:p="http://schemas.openxmlformats.org/presentationml/2006/main">
+  <p:cSld>
+    <p:spTree>
+      <p:nvGrpSpPr>
+        <p:cNvPr id="1" name=""/>
+        <p:cNvGrpSpPr/>
+        <p:nvPr/>
+      </p:nvGrpSpPr>
+      <p:grpSpPr>
+        <a:xfrm>
+          <a:off x="0" y="0"/>
+          <a:ext cx="0" cy="0"/>
+          <a:chOff x="0" y="0"/>
+          <a:chExt cx="0" cy="0"/>
+        </a:xfrm>
+      </p:grpSpPr>
+      <p:grpSp>
+        <p:nvGrpSpPr>
+          <p:cNvPr id="6" name="Group 5">
+            <a:extLst>
+              <a:ext uri="{FF2B5EF4-FFF2-40B4-BE49-F238E27FC236}">
+                <a16:creationId xmlns:a16="http://schemas.microsoft.com/office/drawing/2014/main" id="{5F9F0C52-D20B-FF45-86BA-73D445B391DA}"/>
+              </a:ext>
+            </a:extLst>
+          </p:cNvPr>
+          <p:cNvGrpSpPr/>
+          <p:nvPr/>
+        </p:nvGrpSpPr>
+        <p:grpSpPr>
+          <a:xfrm>
+            <a:off x="3247329" y="3141935"/>
+            <a:ext cx="5697342" cy="3446407"/>
+            <a:chOff x="3247329" y="3141935"/>
+            <a:chExt cx="5697342" cy="3446407"/>
+          </a:xfrm>
+        </p:grpSpPr>
+        <p:pic>
+          <p:nvPicPr>
+            <p:cNvPr id="4" name="Picture 3">
+              <a:extLst>
+                <a:ext uri="{FF2B5EF4-FFF2-40B4-BE49-F238E27FC236}">
+                  <a16:creationId xmlns:a16="http://schemas.microsoft.com/office/drawing/2014/main" id="{4B690363-2C58-A741-A69E-B80D67D0E3B1}"/>
+                </a:ext>
+              </a:extLst>
+            </p:cNvPr>
+            <p:cNvPicPr>
+              <a:picLocks noChangeAspect="1"/>
+            </p:cNvPicPr>
+            <p:nvPr/>
+          </p:nvPicPr>
+          <p:blipFill>
+            <a:blip r:embed="rId2"/>
+            <a:stretch>
+              <a:fillRect/>
+            </a:stretch>
+          </p:blipFill>
+          <p:spPr>
+            <a:xfrm>
+              <a:off x="3247329" y="3141935"/>
+              <a:ext cx="5697342" cy="3446407"/>
+            </a:xfrm>
+            <a:prstGeom prst="rect">
+              <a:avLst/>
+            </a:prstGeom>
+          </p:spPr>
+        </p:pic>
+        <p:sp>
+          <p:nvSpPr>
+            <p:cNvPr id="5" name="TextBox 4">
+              <a:extLst>
+                <a:ext uri="{FF2B5EF4-FFF2-40B4-BE49-F238E27FC236}">
+                  <a16:creationId xmlns:a16="http://schemas.microsoft.com/office/drawing/2014/main" id="{22A65B7F-1925-D948-BF7E-CEE260BC4AD4}"/>
+                </a:ext>
+              </a:extLst>
+            </p:cNvPr>
+            <p:cNvSpPr txBox="1"/>
+            <p:nvPr/>
+          </p:nvSpPr>
+          <p:spPr>
+            <a:xfrm>
+              <a:off x="5148197" y="3407079"/>
+              <a:ext cx="947803" cy="1077239"/>
+            </a:xfrm>
+            <a:prstGeom prst="rect">
+              <a:avLst/>
+            </a:prstGeom>
+            <a:solidFill>
+              <a:schemeClr val="bg1"/>
+            </a:solidFill>
+          </p:spPr>
+          <p:txBody>
+            <a:bodyPr wrap="square" rtlCol="0">
+              <a:spAutoFit/>
+            </a:bodyPr>
+            <a:lstStyle/>
+            <a:p>
+              <a:endParaRPr lang="en-US" dirty="0"/>
+            </a:p>
+          </p:txBody>
+        </p:sp>
+      </p:grpSp>
+      <p:sp>
+        <p:nvSpPr>
+          <p:cNvPr id="2" name="Title 1">
+            <a:extLst>
+              <a:ext uri="{FF2B5EF4-FFF2-40B4-BE49-F238E27FC236}">
+                <a16:creationId xmlns:a16="http://schemas.microsoft.com/office/drawing/2014/main" id="{AF9A391E-92AF-4343-8BCC-0F8DBC76B55A}"/>
+              </a:ext>
+            </a:extLst>
+          </p:cNvPr>
+          <p:cNvSpPr>
+            <a:spLocks noGrp="1"/>
+          </p:cNvSpPr>
+          <p:nvPr>
+            <p:ph type="title"/>
+          </p:nvPr>
+        </p:nvSpPr>
+        <p:spPr/>
+        <p:txBody>
+          <a:bodyPr/>
+          <a:lstStyle/>
+          <a:p>
+            <a:r>
+              <a:rPr lang="en-US" dirty="0"/>
+              <a:t>Color Transformation</a:t>
+            </a:r>
+          </a:p>
+        </p:txBody>
+      </p:sp>
+      <p:sp>
+        <p:nvSpPr>
+          <p:cNvPr id="3" name="Content Placeholder 2">
+            <a:extLst>
+              <a:ext uri="{FF2B5EF4-FFF2-40B4-BE49-F238E27FC236}">
+                <a16:creationId xmlns:a16="http://schemas.microsoft.com/office/drawing/2014/main" id="{913F956B-4E3A-254B-BADB-8F154CE5C680}"/>
+              </a:ext>
+            </a:extLst>
+          </p:cNvPr>
+          <p:cNvSpPr>
+            <a:spLocks noGrp="1"/>
+          </p:cNvSpPr>
+          <p:nvPr>
+            <p:ph idx="1"/>
+          </p:nvPr>
+        </p:nvSpPr>
+        <p:spPr/>
+        <p:txBody>
+          <a:bodyPr/>
+          <a:lstStyle/>
+          <a:p>
+            <a:r>
+              <a:rPr lang="en-US" dirty="0"/>
+              <a:t>RGB to a different color space </a:t>
+            </a:r>
+            <a:r>
+              <a:rPr lang="en-US" dirty="0" err="1"/>
+              <a:t>YCbCr</a:t>
+            </a:r>
+            <a:endParaRPr lang="en-US" dirty="0"/>
+          </a:p>
+          <a:p>
+            <a:r>
+              <a:rPr lang="en-US" dirty="0"/>
+              <a:t>Y represents the brightness</a:t>
+            </a:r>
+          </a:p>
+          <a:p>
+            <a:r>
+              <a:rPr lang="en-US" dirty="0" err="1"/>
+              <a:t>Cb</a:t>
+            </a:r>
+            <a:r>
+              <a:rPr lang="en-US" dirty="0"/>
+              <a:t> and Cr represent the chrominance (</a:t>
+            </a:r>
+            <a:r>
+              <a:rPr lang="en-US" dirty="0" err="1"/>
+              <a:t>Cb</a:t>
+            </a:r>
+            <a:r>
+              <a:rPr lang="en-US" dirty="0"/>
+              <a:t> for blue, Cr for red)</a:t>
+            </a:r>
+          </a:p>
+          <a:p>
+            <a:endParaRPr lang="en-US" dirty="0"/>
           </a:p>
         </p:txBody>
       </p:sp>
@@ -3697,6 +3926,2648 @@
     <p:extLst>
       <p:ext uri="{BB962C8B-B14F-4D97-AF65-F5344CB8AC3E}">
         <p14:creationId xmlns:p14="http://schemas.microsoft.com/office/powerpoint/2010/main" val="568813280"/>
+      </p:ext>
+    </p:extLst>
+  </p:cSld>
+  <p:clrMapOvr>
+    <a:masterClrMapping/>
+  </p:clrMapOvr>
+</p:sld>
+</file>
+
+<file path=ppt/slides/slide6.xml><?xml version="1.0" encoding="utf-8"?>
+<p:sld xmlns:a="http://schemas.openxmlformats.org/drawingml/2006/main" xmlns:r="http://schemas.openxmlformats.org/officeDocument/2006/relationships" xmlns:p="http://schemas.openxmlformats.org/presentationml/2006/main">
+  <p:cSld>
+    <p:spTree>
+      <p:nvGrpSpPr>
+        <p:cNvPr id="1" name=""/>
+        <p:cNvGrpSpPr/>
+        <p:nvPr/>
+      </p:nvGrpSpPr>
+      <p:grpSpPr>
+        <a:xfrm>
+          <a:off x="0" y="0"/>
+          <a:ext cx="0" cy="0"/>
+          <a:chOff x="0" y="0"/>
+          <a:chExt cx="0" cy="0"/>
+        </a:xfrm>
+      </p:grpSpPr>
+      <p:sp>
+        <p:nvSpPr>
+          <p:cNvPr id="2" name="Title 1">
+            <a:extLst>
+              <a:ext uri="{FF2B5EF4-FFF2-40B4-BE49-F238E27FC236}">
+                <a16:creationId xmlns:a16="http://schemas.microsoft.com/office/drawing/2014/main" id="{D001FE5D-6370-1741-BFBA-8DE02EA00E8C}"/>
+              </a:ext>
+            </a:extLst>
+          </p:cNvPr>
+          <p:cNvSpPr>
+            <a:spLocks noGrp="1"/>
+          </p:cNvSpPr>
+          <p:nvPr>
+            <p:ph type="title"/>
+          </p:nvPr>
+        </p:nvSpPr>
+        <p:spPr/>
+        <p:txBody>
+          <a:bodyPr/>
+          <a:lstStyle/>
+          <a:p>
+            <a:r>
+              <a:rPr lang="en-US" dirty="0"/>
+              <a:t>Subsampling</a:t>
+            </a:r>
+          </a:p>
+        </p:txBody>
+      </p:sp>
+      <p:sp>
+        <p:nvSpPr>
+          <p:cNvPr id="3" name="Content Placeholder 2">
+            <a:extLst>
+              <a:ext uri="{FF2B5EF4-FFF2-40B4-BE49-F238E27FC236}">
+                <a16:creationId xmlns:a16="http://schemas.microsoft.com/office/drawing/2014/main" id="{9F2922F9-972D-C248-A8C8-67B526ED6BEE}"/>
+              </a:ext>
+            </a:extLst>
+          </p:cNvPr>
+          <p:cNvSpPr>
+            <a:spLocks noGrp="1"/>
+          </p:cNvSpPr>
+          <p:nvPr>
+            <p:ph idx="1"/>
+          </p:nvPr>
+        </p:nvSpPr>
+        <p:spPr>
+          <a:xfrm>
+            <a:off x="838200" y="1825625"/>
+            <a:ext cx="5299553" cy="4351338"/>
+          </a:xfrm>
+        </p:spPr>
+        <p:txBody>
+          <a:bodyPr/>
+          <a:lstStyle/>
+          <a:p>
+            <a:r>
+              <a:rPr lang="en-US" dirty="0"/>
+              <a:t>Human vision is not sensitive to chrominance domain</a:t>
+            </a:r>
+          </a:p>
+          <a:p>
+            <a:r>
+              <a:rPr lang="en-US" dirty="0"/>
+              <a:t>Reduce chrominance blocks to save storage</a:t>
+            </a:r>
+          </a:p>
+          <a:p>
+            <a:r>
+              <a:rPr lang="en-US" dirty="0"/>
+              <a:t>4:1:1 in our implementation</a:t>
+            </a:r>
+          </a:p>
+        </p:txBody>
+      </p:sp>
+      <p:pic>
+        <p:nvPicPr>
+          <p:cNvPr id="4" name="Picture 3">
+            <a:extLst>
+              <a:ext uri="{FF2B5EF4-FFF2-40B4-BE49-F238E27FC236}">
+                <a16:creationId xmlns:a16="http://schemas.microsoft.com/office/drawing/2014/main" id="{872A0483-DB7D-B247-A58A-3B36C8AF78E2}"/>
+              </a:ext>
+            </a:extLst>
+          </p:cNvPr>
+          <p:cNvPicPr>
+            <a:picLocks noChangeAspect="1"/>
+          </p:cNvPicPr>
+          <p:nvPr/>
+        </p:nvPicPr>
+        <p:blipFill>
+          <a:blip r:embed="rId2"/>
+          <a:stretch>
+            <a:fillRect/>
+          </a:stretch>
+        </p:blipFill>
+        <p:spPr>
+          <a:xfrm>
+            <a:off x="6476983" y="1941451"/>
+            <a:ext cx="4178300" cy="1257300"/>
+          </a:xfrm>
+          <a:prstGeom prst="rect">
+            <a:avLst/>
+          </a:prstGeom>
+        </p:spPr>
+      </p:pic>
+      <p:grpSp>
+        <p:nvGrpSpPr>
+          <p:cNvPr id="47" name="Group 46">
+            <a:extLst>
+              <a:ext uri="{FF2B5EF4-FFF2-40B4-BE49-F238E27FC236}">
+                <a16:creationId xmlns:a16="http://schemas.microsoft.com/office/drawing/2014/main" id="{4AC21C8E-2E25-3E4A-90E7-4BBBA365E8AD}"/>
+              </a:ext>
+            </a:extLst>
+          </p:cNvPr>
+          <p:cNvGrpSpPr>
+            <a:grpSpLocks noChangeAspect="1"/>
+          </p:cNvGrpSpPr>
+          <p:nvPr/>
+        </p:nvGrpSpPr>
+        <p:grpSpPr>
+          <a:xfrm>
+            <a:off x="5367897" y="3682702"/>
+            <a:ext cx="5985903" cy="2083376"/>
+            <a:chOff x="549609" y="3732977"/>
+            <a:chExt cx="5089343" cy="1771331"/>
+          </a:xfrm>
+        </p:grpSpPr>
+        <p:grpSp>
+          <p:nvGrpSpPr>
+            <p:cNvPr id="10" name="Group 9">
+              <a:extLst>
+                <a:ext uri="{FF2B5EF4-FFF2-40B4-BE49-F238E27FC236}">
+                  <a16:creationId xmlns:a16="http://schemas.microsoft.com/office/drawing/2014/main" id="{33EE51D8-7A49-E948-812C-EA3C17333DFE}"/>
+                </a:ext>
+              </a:extLst>
+            </p:cNvPr>
+            <p:cNvGrpSpPr/>
+            <p:nvPr/>
+          </p:nvGrpSpPr>
+          <p:grpSpPr>
+            <a:xfrm>
+              <a:off x="1348067" y="4026474"/>
+              <a:ext cx="1019734" cy="1002824"/>
+              <a:chOff x="1453019" y="4334005"/>
+              <a:chExt cx="1019734" cy="1002824"/>
+            </a:xfrm>
+          </p:grpSpPr>
+          <p:sp>
+            <p:nvSpPr>
+              <p:cNvPr id="5" name="Rectangle 4">
+                <a:extLst>
+                  <a:ext uri="{FF2B5EF4-FFF2-40B4-BE49-F238E27FC236}">
+                    <a16:creationId xmlns:a16="http://schemas.microsoft.com/office/drawing/2014/main" id="{5A74D620-0F12-DD4D-8FA6-20C0E3C36309}"/>
+                  </a:ext>
+                </a:extLst>
+              </p:cNvPr>
+              <p:cNvSpPr/>
+              <p:nvPr/>
+            </p:nvSpPr>
+            <p:spPr>
+              <a:xfrm>
+                <a:off x="1453019" y="4334006"/>
+                <a:ext cx="512064" cy="513567"/>
+              </a:xfrm>
+              <a:prstGeom prst="rect">
+                <a:avLst/>
+              </a:prstGeom>
+              <a:solidFill>
+                <a:schemeClr val="bg1"/>
+              </a:solidFill>
+            </p:spPr>
+            <p:style>
+              <a:lnRef idx="2">
+                <a:schemeClr val="accent1">
+                  <a:shade val="50000"/>
+                </a:schemeClr>
+              </a:lnRef>
+              <a:fillRef idx="1">
+                <a:schemeClr val="accent1"/>
+              </a:fillRef>
+              <a:effectRef idx="0">
+                <a:schemeClr val="accent1"/>
+              </a:effectRef>
+              <a:fontRef idx="minor">
+                <a:schemeClr val="lt1"/>
+              </a:fontRef>
+            </p:style>
+            <p:txBody>
+              <a:bodyPr rtlCol="0" anchor="ctr"/>
+              <a:lstStyle/>
+              <a:p>
+                <a:pPr algn="ctr"/>
+                <a:endParaRPr lang="en-US" dirty="0"/>
+              </a:p>
+            </p:txBody>
+          </p:sp>
+          <p:sp>
+            <p:nvSpPr>
+              <p:cNvPr id="6" name="Rectangle 5">
+                <a:extLst>
+                  <a:ext uri="{FF2B5EF4-FFF2-40B4-BE49-F238E27FC236}">
+                    <a16:creationId xmlns:a16="http://schemas.microsoft.com/office/drawing/2014/main" id="{471DCD40-B259-184C-A7C3-8E5CDA1942F1}"/>
+                  </a:ext>
+                </a:extLst>
+              </p:cNvPr>
+              <p:cNvSpPr/>
+              <p:nvPr/>
+            </p:nvSpPr>
+            <p:spPr>
+              <a:xfrm>
+                <a:off x="1960689" y="4334005"/>
+                <a:ext cx="512064" cy="513567"/>
+              </a:xfrm>
+              <a:prstGeom prst="rect">
+                <a:avLst/>
+              </a:prstGeom>
+              <a:solidFill>
+                <a:schemeClr val="bg1"/>
+              </a:solidFill>
+            </p:spPr>
+            <p:style>
+              <a:lnRef idx="2">
+                <a:schemeClr val="accent1">
+                  <a:shade val="50000"/>
+                </a:schemeClr>
+              </a:lnRef>
+              <a:fillRef idx="1">
+                <a:schemeClr val="accent1"/>
+              </a:fillRef>
+              <a:effectRef idx="0">
+                <a:schemeClr val="accent1"/>
+              </a:effectRef>
+              <a:fontRef idx="minor">
+                <a:schemeClr val="lt1"/>
+              </a:fontRef>
+            </p:style>
+            <p:txBody>
+              <a:bodyPr rtlCol="0" anchor="ctr"/>
+              <a:lstStyle/>
+              <a:p>
+                <a:pPr algn="ctr"/>
+                <a:endParaRPr lang="en-US" dirty="0"/>
+              </a:p>
+            </p:txBody>
+          </p:sp>
+          <p:sp>
+            <p:nvSpPr>
+              <p:cNvPr id="7" name="Rectangle 6">
+                <a:extLst>
+                  <a:ext uri="{FF2B5EF4-FFF2-40B4-BE49-F238E27FC236}">
+                    <a16:creationId xmlns:a16="http://schemas.microsoft.com/office/drawing/2014/main" id="{6879FD44-F0B3-4340-B349-C479C118C627}"/>
+                  </a:ext>
+                </a:extLst>
+              </p:cNvPr>
+              <p:cNvSpPr/>
+              <p:nvPr/>
+            </p:nvSpPr>
+            <p:spPr>
+              <a:xfrm>
+                <a:off x="1453019" y="4823262"/>
+                <a:ext cx="512064" cy="513567"/>
+              </a:xfrm>
+              <a:prstGeom prst="rect">
+                <a:avLst/>
+              </a:prstGeom>
+              <a:solidFill>
+                <a:schemeClr val="bg1"/>
+              </a:solidFill>
+            </p:spPr>
+            <p:style>
+              <a:lnRef idx="2">
+                <a:schemeClr val="accent1">
+                  <a:shade val="50000"/>
+                </a:schemeClr>
+              </a:lnRef>
+              <a:fillRef idx="1">
+                <a:schemeClr val="accent1"/>
+              </a:fillRef>
+              <a:effectRef idx="0">
+                <a:schemeClr val="accent1"/>
+              </a:effectRef>
+              <a:fontRef idx="minor">
+                <a:schemeClr val="lt1"/>
+              </a:fontRef>
+            </p:style>
+            <p:txBody>
+              <a:bodyPr rtlCol="0" anchor="ctr"/>
+              <a:lstStyle/>
+              <a:p>
+                <a:pPr algn="ctr"/>
+                <a:endParaRPr lang="en-US" dirty="0"/>
+              </a:p>
+            </p:txBody>
+          </p:sp>
+          <p:sp>
+            <p:nvSpPr>
+              <p:cNvPr id="8" name="Rectangle 7">
+                <a:extLst>
+                  <a:ext uri="{FF2B5EF4-FFF2-40B4-BE49-F238E27FC236}">
+                    <a16:creationId xmlns:a16="http://schemas.microsoft.com/office/drawing/2014/main" id="{A1B3B47E-587D-1D4B-8384-8EDE228BEABD}"/>
+                  </a:ext>
+                </a:extLst>
+              </p:cNvPr>
+              <p:cNvSpPr/>
+              <p:nvPr/>
+            </p:nvSpPr>
+            <p:spPr>
+              <a:xfrm>
+                <a:off x="1960689" y="4823261"/>
+                <a:ext cx="512064" cy="513567"/>
+              </a:xfrm>
+              <a:prstGeom prst="rect">
+                <a:avLst/>
+              </a:prstGeom>
+              <a:solidFill>
+                <a:schemeClr val="bg1"/>
+              </a:solidFill>
+            </p:spPr>
+            <p:style>
+              <a:lnRef idx="2">
+                <a:schemeClr val="accent1">
+                  <a:shade val="50000"/>
+                </a:schemeClr>
+              </a:lnRef>
+              <a:fillRef idx="1">
+                <a:schemeClr val="accent1"/>
+              </a:fillRef>
+              <a:effectRef idx="0">
+                <a:schemeClr val="accent1"/>
+              </a:effectRef>
+              <a:fontRef idx="minor">
+                <a:schemeClr val="lt1"/>
+              </a:fontRef>
+            </p:style>
+            <p:txBody>
+              <a:bodyPr rtlCol="0" anchor="ctr"/>
+              <a:lstStyle/>
+              <a:p>
+                <a:pPr algn="ctr"/>
+                <a:endParaRPr lang="en-US" dirty="0"/>
+              </a:p>
+            </p:txBody>
+          </p:sp>
+        </p:grpSp>
+        <p:sp>
+          <p:nvSpPr>
+            <p:cNvPr id="9" name="Rectangle 8">
+              <a:extLst>
+                <a:ext uri="{FF2B5EF4-FFF2-40B4-BE49-F238E27FC236}">
+                  <a16:creationId xmlns:a16="http://schemas.microsoft.com/office/drawing/2014/main" id="{FB7D05AC-7EB8-684C-808F-AD233D07E55F}"/>
+                </a:ext>
+              </a:extLst>
+            </p:cNvPr>
+            <p:cNvSpPr/>
+            <p:nvPr/>
+          </p:nvSpPr>
+          <p:spPr>
+            <a:xfrm>
+              <a:off x="4355456" y="4542723"/>
+              <a:ext cx="512064" cy="513567"/>
+            </a:xfrm>
+            <a:prstGeom prst="rect">
+              <a:avLst/>
+            </a:prstGeom>
+            <a:solidFill>
+              <a:schemeClr val="bg1"/>
+            </a:solidFill>
+          </p:spPr>
+          <p:style>
+            <a:lnRef idx="2">
+              <a:schemeClr val="accent1">
+                <a:shade val="50000"/>
+              </a:schemeClr>
+            </a:lnRef>
+            <a:fillRef idx="1">
+              <a:schemeClr val="accent1"/>
+            </a:fillRef>
+            <a:effectRef idx="0">
+              <a:schemeClr val="accent1"/>
+            </a:effectRef>
+            <a:fontRef idx="minor">
+              <a:schemeClr val="lt1"/>
+            </a:fontRef>
+          </p:style>
+          <p:txBody>
+            <a:bodyPr rtlCol="0" anchor="ctr"/>
+            <a:lstStyle/>
+            <a:p>
+              <a:pPr algn="ctr"/>
+              <a:endParaRPr lang="en-US" dirty="0"/>
+            </a:p>
+          </p:txBody>
+        </p:sp>
+        <p:grpSp>
+          <p:nvGrpSpPr>
+            <p:cNvPr id="11" name="Group 10">
+              <a:extLst>
+                <a:ext uri="{FF2B5EF4-FFF2-40B4-BE49-F238E27FC236}">
+                  <a16:creationId xmlns:a16="http://schemas.microsoft.com/office/drawing/2014/main" id="{B2FC4723-357F-7D48-A1A1-F71C2EAD99F0}"/>
+                </a:ext>
+              </a:extLst>
+            </p:cNvPr>
+            <p:cNvGrpSpPr/>
+            <p:nvPr/>
+          </p:nvGrpSpPr>
+          <p:grpSpPr>
+            <a:xfrm>
+              <a:off x="1094232" y="4271103"/>
+              <a:ext cx="1019734" cy="1002824"/>
+              <a:chOff x="1453019" y="4334005"/>
+              <a:chExt cx="1019734" cy="1002824"/>
+            </a:xfrm>
+          </p:grpSpPr>
+          <p:sp>
+            <p:nvSpPr>
+              <p:cNvPr id="12" name="Rectangle 11">
+                <a:extLst>
+                  <a:ext uri="{FF2B5EF4-FFF2-40B4-BE49-F238E27FC236}">
+                    <a16:creationId xmlns:a16="http://schemas.microsoft.com/office/drawing/2014/main" id="{1BC4596C-0AA2-6142-A67D-1275C31B8318}"/>
+                  </a:ext>
+                </a:extLst>
+              </p:cNvPr>
+              <p:cNvSpPr/>
+              <p:nvPr/>
+            </p:nvSpPr>
+            <p:spPr>
+              <a:xfrm>
+                <a:off x="1453019" y="4334006"/>
+                <a:ext cx="512064" cy="513567"/>
+              </a:xfrm>
+              <a:prstGeom prst="rect">
+                <a:avLst/>
+              </a:prstGeom>
+              <a:solidFill>
+                <a:schemeClr val="bg1"/>
+              </a:solidFill>
+            </p:spPr>
+            <p:style>
+              <a:lnRef idx="2">
+                <a:schemeClr val="accent1">
+                  <a:shade val="50000"/>
+                </a:schemeClr>
+              </a:lnRef>
+              <a:fillRef idx="1">
+                <a:schemeClr val="accent1"/>
+              </a:fillRef>
+              <a:effectRef idx="0">
+                <a:schemeClr val="accent1"/>
+              </a:effectRef>
+              <a:fontRef idx="minor">
+                <a:schemeClr val="lt1"/>
+              </a:fontRef>
+            </p:style>
+            <p:txBody>
+              <a:bodyPr rtlCol="0" anchor="ctr"/>
+              <a:lstStyle/>
+              <a:p>
+                <a:pPr algn="ctr"/>
+                <a:endParaRPr lang="en-US" dirty="0"/>
+              </a:p>
+            </p:txBody>
+          </p:sp>
+          <p:sp>
+            <p:nvSpPr>
+              <p:cNvPr id="13" name="Rectangle 12">
+                <a:extLst>
+                  <a:ext uri="{FF2B5EF4-FFF2-40B4-BE49-F238E27FC236}">
+                    <a16:creationId xmlns:a16="http://schemas.microsoft.com/office/drawing/2014/main" id="{5E83E706-6CBD-CE4B-A0C7-34EED8B066C7}"/>
+                  </a:ext>
+                </a:extLst>
+              </p:cNvPr>
+              <p:cNvSpPr/>
+              <p:nvPr/>
+            </p:nvSpPr>
+            <p:spPr>
+              <a:xfrm>
+                <a:off x="1960689" y="4334005"/>
+                <a:ext cx="512064" cy="513567"/>
+              </a:xfrm>
+              <a:prstGeom prst="rect">
+                <a:avLst/>
+              </a:prstGeom>
+              <a:solidFill>
+                <a:schemeClr val="bg1"/>
+              </a:solidFill>
+            </p:spPr>
+            <p:style>
+              <a:lnRef idx="2">
+                <a:schemeClr val="accent1">
+                  <a:shade val="50000"/>
+                </a:schemeClr>
+              </a:lnRef>
+              <a:fillRef idx="1">
+                <a:schemeClr val="accent1"/>
+              </a:fillRef>
+              <a:effectRef idx="0">
+                <a:schemeClr val="accent1"/>
+              </a:effectRef>
+              <a:fontRef idx="minor">
+                <a:schemeClr val="lt1"/>
+              </a:fontRef>
+            </p:style>
+            <p:txBody>
+              <a:bodyPr rtlCol="0" anchor="ctr"/>
+              <a:lstStyle/>
+              <a:p>
+                <a:pPr algn="ctr"/>
+                <a:endParaRPr lang="en-US" dirty="0"/>
+              </a:p>
+            </p:txBody>
+          </p:sp>
+          <p:sp>
+            <p:nvSpPr>
+              <p:cNvPr id="14" name="Rectangle 13">
+                <a:extLst>
+                  <a:ext uri="{FF2B5EF4-FFF2-40B4-BE49-F238E27FC236}">
+                    <a16:creationId xmlns:a16="http://schemas.microsoft.com/office/drawing/2014/main" id="{8863F812-9DF0-2645-A3C6-0B721BB05C50}"/>
+                  </a:ext>
+                </a:extLst>
+              </p:cNvPr>
+              <p:cNvSpPr/>
+              <p:nvPr/>
+            </p:nvSpPr>
+            <p:spPr>
+              <a:xfrm>
+                <a:off x="1453019" y="4823262"/>
+                <a:ext cx="512064" cy="513567"/>
+              </a:xfrm>
+              <a:prstGeom prst="rect">
+                <a:avLst/>
+              </a:prstGeom>
+              <a:solidFill>
+                <a:schemeClr val="bg1"/>
+              </a:solidFill>
+            </p:spPr>
+            <p:style>
+              <a:lnRef idx="2">
+                <a:schemeClr val="accent1">
+                  <a:shade val="50000"/>
+                </a:schemeClr>
+              </a:lnRef>
+              <a:fillRef idx="1">
+                <a:schemeClr val="accent1"/>
+              </a:fillRef>
+              <a:effectRef idx="0">
+                <a:schemeClr val="accent1"/>
+              </a:effectRef>
+              <a:fontRef idx="minor">
+                <a:schemeClr val="lt1"/>
+              </a:fontRef>
+            </p:style>
+            <p:txBody>
+              <a:bodyPr rtlCol="0" anchor="ctr"/>
+              <a:lstStyle/>
+              <a:p>
+                <a:pPr algn="ctr"/>
+                <a:endParaRPr lang="en-US" dirty="0"/>
+              </a:p>
+            </p:txBody>
+          </p:sp>
+          <p:sp>
+            <p:nvSpPr>
+              <p:cNvPr id="15" name="Rectangle 14">
+                <a:extLst>
+                  <a:ext uri="{FF2B5EF4-FFF2-40B4-BE49-F238E27FC236}">
+                    <a16:creationId xmlns:a16="http://schemas.microsoft.com/office/drawing/2014/main" id="{4AD4011B-2494-D144-A02F-72378A650D82}"/>
+                  </a:ext>
+                </a:extLst>
+              </p:cNvPr>
+              <p:cNvSpPr/>
+              <p:nvPr/>
+            </p:nvSpPr>
+            <p:spPr>
+              <a:xfrm>
+                <a:off x="1960689" y="4823261"/>
+                <a:ext cx="512064" cy="513567"/>
+              </a:xfrm>
+              <a:prstGeom prst="rect">
+                <a:avLst/>
+              </a:prstGeom>
+              <a:solidFill>
+                <a:schemeClr val="bg1"/>
+              </a:solidFill>
+            </p:spPr>
+            <p:style>
+              <a:lnRef idx="2">
+                <a:schemeClr val="accent1">
+                  <a:shade val="50000"/>
+                </a:schemeClr>
+              </a:lnRef>
+              <a:fillRef idx="1">
+                <a:schemeClr val="accent1"/>
+              </a:fillRef>
+              <a:effectRef idx="0">
+                <a:schemeClr val="accent1"/>
+              </a:effectRef>
+              <a:fontRef idx="minor">
+                <a:schemeClr val="lt1"/>
+              </a:fontRef>
+            </p:style>
+            <p:txBody>
+              <a:bodyPr rtlCol="0" anchor="ctr"/>
+              <a:lstStyle/>
+              <a:p>
+                <a:pPr algn="ctr"/>
+                <a:endParaRPr lang="en-US" dirty="0"/>
+              </a:p>
+            </p:txBody>
+          </p:sp>
+        </p:grpSp>
+        <p:grpSp>
+          <p:nvGrpSpPr>
+            <p:cNvPr id="16" name="Group 15">
+              <a:extLst>
+                <a:ext uri="{FF2B5EF4-FFF2-40B4-BE49-F238E27FC236}">
+                  <a16:creationId xmlns:a16="http://schemas.microsoft.com/office/drawing/2014/main" id="{A747E923-13F2-404A-9149-D3A26E987B55}"/>
+                </a:ext>
+              </a:extLst>
+            </p:cNvPr>
+            <p:cNvGrpSpPr/>
+            <p:nvPr/>
+          </p:nvGrpSpPr>
+          <p:grpSpPr>
+            <a:xfrm>
+              <a:off x="838200" y="4501484"/>
+              <a:ext cx="1019734" cy="1002824"/>
+              <a:chOff x="1453019" y="4334005"/>
+              <a:chExt cx="1019734" cy="1002824"/>
+            </a:xfrm>
+          </p:grpSpPr>
+          <p:sp>
+            <p:nvSpPr>
+              <p:cNvPr id="17" name="Rectangle 16">
+                <a:extLst>
+                  <a:ext uri="{FF2B5EF4-FFF2-40B4-BE49-F238E27FC236}">
+                    <a16:creationId xmlns:a16="http://schemas.microsoft.com/office/drawing/2014/main" id="{5C6CF068-17C2-7949-BF75-D3392AB02905}"/>
+                  </a:ext>
+                </a:extLst>
+              </p:cNvPr>
+              <p:cNvSpPr/>
+              <p:nvPr/>
+            </p:nvSpPr>
+            <p:spPr>
+              <a:xfrm>
+                <a:off x="1453019" y="4334006"/>
+                <a:ext cx="512064" cy="513567"/>
+              </a:xfrm>
+              <a:prstGeom prst="rect">
+                <a:avLst/>
+              </a:prstGeom>
+              <a:solidFill>
+                <a:schemeClr val="bg1"/>
+              </a:solidFill>
+            </p:spPr>
+            <p:style>
+              <a:lnRef idx="2">
+                <a:schemeClr val="accent1">
+                  <a:shade val="50000"/>
+                </a:schemeClr>
+              </a:lnRef>
+              <a:fillRef idx="1">
+                <a:schemeClr val="accent1"/>
+              </a:fillRef>
+              <a:effectRef idx="0">
+                <a:schemeClr val="accent1"/>
+              </a:effectRef>
+              <a:fontRef idx="minor">
+                <a:schemeClr val="lt1"/>
+              </a:fontRef>
+            </p:style>
+            <p:txBody>
+              <a:bodyPr rtlCol="0" anchor="ctr"/>
+              <a:lstStyle/>
+              <a:p>
+                <a:pPr algn="ctr"/>
+                <a:endParaRPr lang="en-US" dirty="0"/>
+              </a:p>
+            </p:txBody>
+          </p:sp>
+          <p:sp>
+            <p:nvSpPr>
+              <p:cNvPr id="18" name="Rectangle 17">
+                <a:extLst>
+                  <a:ext uri="{FF2B5EF4-FFF2-40B4-BE49-F238E27FC236}">
+                    <a16:creationId xmlns:a16="http://schemas.microsoft.com/office/drawing/2014/main" id="{A6DF9AEA-DCEC-0D4E-B2F8-9C691E301AF6}"/>
+                  </a:ext>
+                </a:extLst>
+              </p:cNvPr>
+              <p:cNvSpPr/>
+              <p:nvPr/>
+            </p:nvSpPr>
+            <p:spPr>
+              <a:xfrm>
+                <a:off x="1960689" y="4334005"/>
+                <a:ext cx="512064" cy="513567"/>
+              </a:xfrm>
+              <a:prstGeom prst="rect">
+                <a:avLst/>
+              </a:prstGeom>
+              <a:solidFill>
+                <a:schemeClr val="bg1"/>
+              </a:solidFill>
+            </p:spPr>
+            <p:style>
+              <a:lnRef idx="2">
+                <a:schemeClr val="accent1">
+                  <a:shade val="50000"/>
+                </a:schemeClr>
+              </a:lnRef>
+              <a:fillRef idx="1">
+                <a:schemeClr val="accent1"/>
+              </a:fillRef>
+              <a:effectRef idx="0">
+                <a:schemeClr val="accent1"/>
+              </a:effectRef>
+              <a:fontRef idx="minor">
+                <a:schemeClr val="lt1"/>
+              </a:fontRef>
+            </p:style>
+            <p:txBody>
+              <a:bodyPr rtlCol="0" anchor="ctr"/>
+              <a:lstStyle/>
+              <a:p>
+                <a:pPr algn="ctr"/>
+                <a:endParaRPr lang="en-US" dirty="0"/>
+              </a:p>
+            </p:txBody>
+          </p:sp>
+          <p:sp>
+            <p:nvSpPr>
+              <p:cNvPr id="19" name="Rectangle 18">
+                <a:extLst>
+                  <a:ext uri="{FF2B5EF4-FFF2-40B4-BE49-F238E27FC236}">
+                    <a16:creationId xmlns:a16="http://schemas.microsoft.com/office/drawing/2014/main" id="{525A8B8B-E0D0-E94C-8D70-D98901C15CB3}"/>
+                  </a:ext>
+                </a:extLst>
+              </p:cNvPr>
+              <p:cNvSpPr/>
+              <p:nvPr/>
+            </p:nvSpPr>
+            <p:spPr>
+              <a:xfrm>
+                <a:off x="1453019" y="4823262"/>
+                <a:ext cx="512064" cy="513567"/>
+              </a:xfrm>
+              <a:prstGeom prst="rect">
+                <a:avLst/>
+              </a:prstGeom>
+              <a:solidFill>
+                <a:schemeClr val="bg1"/>
+              </a:solidFill>
+            </p:spPr>
+            <p:style>
+              <a:lnRef idx="2">
+                <a:schemeClr val="accent1">
+                  <a:shade val="50000"/>
+                </a:schemeClr>
+              </a:lnRef>
+              <a:fillRef idx="1">
+                <a:schemeClr val="accent1"/>
+              </a:fillRef>
+              <a:effectRef idx="0">
+                <a:schemeClr val="accent1"/>
+              </a:effectRef>
+              <a:fontRef idx="minor">
+                <a:schemeClr val="lt1"/>
+              </a:fontRef>
+            </p:style>
+            <p:txBody>
+              <a:bodyPr rtlCol="0" anchor="ctr"/>
+              <a:lstStyle/>
+              <a:p>
+                <a:pPr algn="ctr"/>
+                <a:endParaRPr lang="en-US" dirty="0"/>
+              </a:p>
+            </p:txBody>
+          </p:sp>
+          <p:sp>
+            <p:nvSpPr>
+              <p:cNvPr id="20" name="Rectangle 19">
+                <a:extLst>
+                  <a:ext uri="{FF2B5EF4-FFF2-40B4-BE49-F238E27FC236}">
+                    <a16:creationId xmlns:a16="http://schemas.microsoft.com/office/drawing/2014/main" id="{FE00F701-0194-2045-A6C2-BE7E7BFF4D04}"/>
+                  </a:ext>
+                </a:extLst>
+              </p:cNvPr>
+              <p:cNvSpPr/>
+              <p:nvPr/>
+            </p:nvSpPr>
+            <p:spPr>
+              <a:xfrm>
+                <a:off x="1960689" y="4823261"/>
+                <a:ext cx="512064" cy="513567"/>
+              </a:xfrm>
+              <a:prstGeom prst="rect">
+                <a:avLst/>
+              </a:prstGeom>
+              <a:solidFill>
+                <a:schemeClr val="bg1"/>
+              </a:solidFill>
+            </p:spPr>
+            <p:style>
+              <a:lnRef idx="2">
+                <a:schemeClr val="accent1">
+                  <a:shade val="50000"/>
+                </a:schemeClr>
+              </a:lnRef>
+              <a:fillRef idx="1">
+                <a:schemeClr val="accent1"/>
+              </a:fillRef>
+              <a:effectRef idx="0">
+                <a:schemeClr val="accent1"/>
+              </a:effectRef>
+              <a:fontRef idx="minor">
+                <a:schemeClr val="lt1"/>
+              </a:fontRef>
+            </p:style>
+            <p:txBody>
+              <a:bodyPr rtlCol="0" anchor="ctr"/>
+              <a:lstStyle/>
+              <a:p>
+                <a:pPr algn="ctr"/>
+                <a:endParaRPr lang="en-US" dirty="0"/>
+              </a:p>
+            </p:txBody>
+          </p:sp>
+        </p:grpSp>
+        <p:grpSp>
+          <p:nvGrpSpPr>
+            <p:cNvPr id="33" name="Group 32">
+              <a:extLst>
+                <a:ext uri="{FF2B5EF4-FFF2-40B4-BE49-F238E27FC236}">
+                  <a16:creationId xmlns:a16="http://schemas.microsoft.com/office/drawing/2014/main" id="{3F7DDC5F-CE75-9E47-A308-83F04FA5AB66}"/>
+                </a:ext>
+              </a:extLst>
+            </p:cNvPr>
+            <p:cNvGrpSpPr/>
+            <p:nvPr/>
+          </p:nvGrpSpPr>
+          <p:grpSpPr>
+            <a:xfrm>
+              <a:off x="3076354" y="4271101"/>
+              <a:ext cx="1019734" cy="1002824"/>
+              <a:chOff x="1453019" y="4334005"/>
+              <a:chExt cx="1019734" cy="1002824"/>
+            </a:xfrm>
+          </p:grpSpPr>
+          <p:sp>
+            <p:nvSpPr>
+              <p:cNvPr id="34" name="Rectangle 33">
+                <a:extLst>
+                  <a:ext uri="{FF2B5EF4-FFF2-40B4-BE49-F238E27FC236}">
+                    <a16:creationId xmlns:a16="http://schemas.microsoft.com/office/drawing/2014/main" id="{C9588BFF-F553-1D46-885C-5B4DD4B1FAAF}"/>
+                  </a:ext>
+                </a:extLst>
+              </p:cNvPr>
+              <p:cNvSpPr/>
+              <p:nvPr/>
+            </p:nvSpPr>
+            <p:spPr>
+              <a:xfrm>
+                <a:off x="1453019" y="4334006"/>
+                <a:ext cx="512064" cy="513567"/>
+              </a:xfrm>
+              <a:prstGeom prst="rect">
+                <a:avLst/>
+              </a:prstGeom>
+              <a:solidFill>
+                <a:schemeClr val="bg1"/>
+              </a:solidFill>
+            </p:spPr>
+            <p:style>
+              <a:lnRef idx="2">
+                <a:schemeClr val="accent1">
+                  <a:shade val="50000"/>
+                </a:schemeClr>
+              </a:lnRef>
+              <a:fillRef idx="1">
+                <a:schemeClr val="accent1"/>
+              </a:fillRef>
+              <a:effectRef idx="0">
+                <a:schemeClr val="accent1"/>
+              </a:effectRef>
+              <a:fontRef idx="minor">
+                <a:schemeClr val="lt1"/>
+              </a:fontRef>
+            </p:style>
+            <p:txBody>
+              <a:bodyPr rtlCol="0" anchor="ctr"/>
+              <a:lstStyle/>
+              <a:p>
+                <a:pPr algn="ctr"/>
+                <a:endParaRPr lang="en-US" dirty="0"/>
+              </a:p>
+            </p:txBody>
+          </p:sp>
+          <p:sp>
+            <p:nvSpPr>
+              <p:cNvPr id="35" name="Rectangle 34">
+                <a:extLst>
+                  <a:ext uri="{FF2B5EF4-FFF2-40B4-BE49-F238E27FC236}">
+                    <a16:creationId xmlns:a16="http://schemas.microsoft.com/office/drawing/2014/main" id="{78C3E238-BC6F-5C4B-B4E9-62AE82801046}"/>
+                  </a:ext>
+                </a:extLst>
+              </p:cNvPr>
+              <p:cNvSpPr/>
+              <p:nvPr/>
+            </p:nvSpPr>
+            <p:spPr>
+              <a:xfrm>
+                <a:off x="1960689" y="4334005"/>
+                <a:ext cx="512064" cy="513567"/>
+              </a:xfrm>
+              <a:prstGeom prst="rect">
+                <a:avLst/>
+              </a:prstGeom>
+              <a:solidFill>
+                <a:schemeClr val="bg1"/>
+              </a:solidFill>
+            </p:spPr>
+            <p:style>
+              <a:lnRef idx="2">
+                <a:schemeClr val="accent1">
+                  <a:shade val="50000"/>
+                </a:schemeClr>
+              </a:lnRef>
+              <a:fillRef idx="1">
+                <a:schemeClr val="accent1"/>
+              </a:fillRef>
+              <a:effectRef idx="0">
+                <a:schemeClr val="accent1"/>
+              </a:effectRef>
+              <a:fontRef idx="minor">
+                <a:schemeClr val="lt1"/>
+              </a:fontRef>
+            </p:style>
+            <p:txBody>
+              <a:bodyPr rtlCol="0" anchor="ctr"/>
+              <a:lstStyle/>
+              <a:p>
+                <a:pPr algn="ctr"/>
+                <a:endParaRPr lang="en-US" dirty="0"/>
+              </a:p>
+            </p:txBody>
+          </p:sp>
+          <p:sp>
+            <p:nvSpPr>
+              <p:cNvPr id="36" name="Rectangle 35">
+                <a:extLst>
+                  <a:ext uri="{FF2B5EF4-FFF2-40B4-BE49-F238E27FC236}">
+                    <a16:creationId xmlns:a16="http://schemas.microsoft.com/office/drawing/2014/main" id="{628A5BCA-3C54-EE49-BF6F-EFE7046FCC50}"/>
+                  </a:ext>
+                </a:extLst>
+              </p:cNvPr>
+              <p:cNvSpPr/>
+              <p:nvPr/>
+            </p:nvSpPr>
+            <p:spPr>
+              <a:xfrm>
+                <a:off x="1453019" y="4823262"/>
+                <a:ext cx="512064" cy="513567"/>
+              </a:xfrm>
+              <a:prstGeom prst="rect">
+                <a:avLst/>
+              </a:prstGeom>
+              <a:solidFill>
+                <a:schemeClr val="bg1"/>
+              </a:solidFill>
+            </p:spPr>
+            <p:style>
+              <a:lnRef idx="2">
+                <a:schemeClr val="accent1">
+                  <a:shade val="50000"/>
+                </a:schemeClr>
+              </a:lnRef>
+              <a:fillRef idx="1">
+                <a:schemeClr val="accent1"/>
+              </a:fillRef>
+              <a:effectRef idx="0">
+                <a:schemeClr val="accent1"/>
+              </a:effectRef>
+              <a:fontRef idx="minor">
+                <a:schemeClr val="lt1"/>
+              </a:fontRef>
+            </p:style>
+            <p:txBody>
+              <a:bodyPr rtlCol="0" anchor="ctr"/>
+              <a:lstStyle/>
+              <a:p>
+                <a:pPr algn="ctr"/>
+                <a:endParaRPr lang="en-US" dirty="0"/>
+              </a:p>
+            </p:txBody>
+          </p:sp>
+          <p:sp>
+            <p:nvSpPr>
+              <p:cNvPr id="37" name="Rectangle 36">
+                <a:extLst>
+                  <a:ext uri="{FF2B5EF4-FFF2-40B4-BE49-F238E27FC236}">
+                    <a16:creationId xmlns:a16="http://schemas.microsoft.com/office/drawing/2014/main" id="{6BFAB85B-7A57-EE41-9A60-702B46CF64B3}"/>
+                  </a:ext>
+                </a:extLst>
+              </p:cNvPr>
+              <p:cNvSpPr/>
+              <p:nvPr/>
+            </p:nvSpPr>
+            <p:spPr>
+              <a:xfrm>
+                <a:off x="1960689" y="4823261"/>
+                <a:ext cx="512064" cy="513567"/>
+              </a:xfrm>
+              <a:prstGeom prst="rect">
+                <a:avLst/>
+              </a:prstGeom>
+              <a:solidFill>
+                <a:schemeClr val="bg1"/>
+              </a:solidFill>
+            </p:spPr>
+            <p:style>
+              <a:lnRef idx="2">
+                <a:schemeClr val="accent1">
+                  <a:shade val="50000"/>
+                </a:schemeClr>
+              </a:lnRef>
+              <a:fillRef idx="1">
+                <a:schemeClr val="accent1"/>
+              </a:fillRef>
+              <a:effectRef idx="0">
+                <a:schemeClr val="accent1"/>
+              </a:effectRef>
+              <a:fontRef idx="minor">
+                <a:schemeClr val="lt1"/>
+              </a:fontRef>
+            </p:style>
+            <p:txBody>
+              <a:bodyPr rtlCol="0" anchor="ctr"/>
+              <a:lstStyle/>
+              <a:p>
+                <a:pPr algn="ctr"/>
+                <a:endParaRPr lang="en-US" dirty="0"/>
+              </a:p>
+            </p:txBody>
+          </p:sp>
+        </p:grpSp>
+        <p:sp>
+          <p:nvSpPr>
+            <p:cNvPr id="38" name="Rectangle 37">
+              <a:extLst>
+                <a:ext uri="{FF2B5EF4-FFF2-40B4-BE49-F238E27FC236}">
+                  <a16:creationId xmlns:a16="http://schemas.microsoft.com/office/drawing/2014/main" id="{48C6FD98-1B6E-C042-A66F-5D67C3BB5A6B}"/>
+                </a:ext>
+              </a:extLst>
+            </p:cNvPr>
+            <p:cNvSpPr/>
+            <p:nvPr/>
+          </p:nvSpPr>
+          <p:spPr>
+            <a:xfrm>
+              <a:off x="5126888" y="4550171"/>
+              <a:ext cx="512064" cy="513567"/>
+            </a:xfrm>
+            <a:prstGeom prst="rect">
+              <a:avLst/>
+            </a:prstGeom>
+            <a:solidFill>
+              <a:schemeClr val="bg1"/>
+            </a:solidFill>
+          </p:spPr>
+          <p:style>
+            <a:lnRef idx="2">
+              <a:schemeClr val="accent1">
+                <a:shade val="50000"/>
+              </a:schemeClr>
+            </a:lnRef>
+            <a:fillRef idx="1">
+              <a:schemeClr val="accent1"/>
+            </a:fillRef>
+            <a:effectRef idx="0">
+              <a:schemeClr val="accent1"/>
+            </a:effectRef>
+            <a:fontRef idx="minor">
+              <a:schemeClr val="lt1"/>
+            </a:fontRef>
+          </p:style>
+          <p:txBody>
+            <a:bodyPr rtlCol="0" anchor="ctr"/>
+            <a:lstStyle/>
+            <a:p>
+              <a:pPr algn="ctr"/>
+              <a:endParaRPr lang="en-US" dirty="0"/>
+            </a:p>
+          </p:txBody>
+        </p:sp>
+        <p:sp>
+          <p:nvSpPr>
+            <p:cNvPr id="39" name="TextBox 38">
+              <a:extLst>
+                <a:ext uri="{FF2B5EF4-FFF2-40B4-BE49-F238E27FC236}">
+                  <a16:creationId xmlns:a16="http://schemas.microsoft.com/office/drawing/2014/main" id="{A47A5E32-5417-D94D-B8A6-7E8A96D626DB}"/>
+                </a:ext>
+              </a:extLst>
+            </p:cNvPr>
+            <p:cNvSpPr txBox="1"/>
+            <p:nvPr/>
+          </p:nvSpPr>
+          <p:spPr>
+            <a:xfrm>
+              <a:off x="549609" y="4621408"/>
+              <a:ext cx="296876" cy="369332"/>
+            </a:xfrm>
+            <a:prstGeom prst="rect">
+              <a:avLst/>
+            </a:prstGeom>
+            <a:noFill/>
+          </p:spPr>
+          <p:txBody>
+            <a:bodyPr wrap="none" rtlCol="0">
+              <a:spAutoFit/>
+            </a:bodyPr>
+            <a:lstStyle/>
+            <a:p>
+              <a:r>
+                <a:rPr lang="en-US" dirty="0"/>
+                <a:t>Y</a:t>
+              </a:r>
+            </a:p>
+          </p:txBody>
+        </p:sp>
+        <p:sp>
+          <p:nvSpPr>
+            <p:cNvPr id="40" name="TextBox 39">
+              <a:extLst>
+                <a:ext uri="{FF2B5EF4-FFF2-40B4-BE49-F238E27FC236}">
+                  <a16:creationId xmlns:a16="http://schemas.microsoft.com/office/drawing/2014/main" id="{DD09AA2F-0418-A543-9DF8-5935ABDCDC52}"/>
+                </a:ext>
+              </a:extLst>
+            </p:cNvPr>
+            <p:cNvSpPr txBox="1"/>
+            <p:nvPr/>
+          </p:nvSpPr>
+          <p:spPr>
+            <a:xfrm>
+              <a:off x="849345" y="3984360"/>
+              <a:ext cx="429926" cy="369332"/>
+            </a:xfrm>
+            <a:prstGeom prst="rect">
+              <a:avLst/>
+            </a:prstGeom>
+            <a:noFill/>
+          </p:spPr>
+          <p:txBody>
+            <a:bodyPr wrap="none" rtlCol="0">
+              <a:spAutoFit/>
+            </a:bodyPr>
+            <a:lstStyle/>
+            <a:p>
+              <a:r>
+                <a:rPr lang="en-US" dirty="0" err="1"/>
+                <a:t>Cb</a:t>
+              </a:r>
+              <a:endParaRPr lang="en-US" dirty="0"/>
+            </a:p>
+          </p:txBody>
+        </p:sp>
+        <p:sp>
+          <p:nvSpPr>
+            <p:cNvPr id="41" name="TextBox 40">
+              <a:extLst>
+                <a:ext uri="{FF2B5EF4-FFF2-40B4-BE49-F238E27FC236}">
+                  <a16:creationId xmlns:a16="http://schemas.microsoft.com/office/drawing/2014/main" id="{B9BBBA5A-A006-3D43-B8E1-7BDD75E3292B}"/>
+                </a:ext>
+              </a:extLst>
+            </p:cNvPr>
+            <p:cNvSpPr txBox="1"/>
+            <p:nvPr/>
+          </p:nvSpPr>
+          <p:spPr>
+            <a:xfrm>
+              <a:off x="1528712" y="3732977"/>
+              <a:ext cx="388248" cy="369332"/>
+            </a:xfrm>
+            <a:prstGeom prst="rect">
+              <a:avLst/>
+            </a:prstGeom>
+            <a:noFill/>
+          </p:spPr>
+          <p:txBody>
+            <a:bodyPr wrap="none" rtlCol="0">
+              <a:spAutoFit/>
+            </a:bodyPr>
+            <a:lstStyle/>
+            <a:p>
+              <a:r>
+                <a:rPr lang="en-US" dirty="0"/>
+                <a:t>Cr</a:t>
+              </a:r>
+            </a:p>
+          </p:txBody>
+        </p:sp>
+        <p:sp>
+          <p:nvSpPr>
+            <p:cNvPr id="42" name="TextBox 41">
+              <a:extLst>
+                <a:ext uri="{FF2B5EF4-FFF2-40B4-BE49-F238E27FC236}">
+                  <a16:creationId xmlns:a16="http://schemas.microsoft.com/office/drawing/2014/main" id="{2CB64C1A-3463-6E4D-8F9D-2EDA2767382B}"/>
+                </a:ext>
+              </a:extLst>
+            </p:cNvPr>
+            <p:cNvSpPr txBox="1"/>
+            <p:nvPr/>
+          </p:nvSpPr>
+          <p:spPr>
+            <a:xfrm>
+              <a:off x="3419816" y="3951498"/>
+              <a:ext cx="296876" cy="369332"/>
+            </a:xfrm>
+            <a:prstGeom prst="rect">
+              <a:avLst/>
+            </a:prstGeom>
+            <a:noFill/>
+          </p:spPr>
+          <p:txBody>
+            <a:bodyPr wrap="none" rtlCol="0">
+              <a:spAutoFit/>
+            </a:bodyPr>
+            <a:lstStyle/>
+            <a:p>
+              <a:r>
+                <a:rPr lang="en-US" dirty="0"/>
+                <a:t>Y</a:t>
+              </a:r>
+            </a:p>
+          </p:txBody>
+        </p:sp>
+        <p:sp>
+          <p:nvSpPr>
+            <p:cNvPr id="43" name="TextBox 42">
+              <a:extLst>
+                <a:ext uri="{FF2B5EF4-FFF2-40B4-BE49-F238E27FC236}">
+                  <a16:creationId xmlns:a16="http://schemas.microsoft.com/office/drawing/2014/main" id="{A32D24C3-337C-1741-8CB9-3459DF2A6886}"/>
+                </a:ext>
+              </a:extLst>
+            </p:cNvPr>
+            <p:cNvSpPr txBox="1"/>
+            <p:nvPr/>
+          </p:nvSpPr>
+          <p:spPr>
+            <a:xfrm>
+              <a:off x="4369022" y="4223120"/>
+              <a:ext cx="429926" cy="369332"/>
+            </a:xfrm>
+            <a:prstGeom prst="rect">
+              <a:avLst/>
+            </a:prstGeom>
+            <a:noFill/>
+          </p:spPr>
+          <p:txBody>
+            <a:bodyPr wrap="none" rtlCol="0">
+              <a:spAutoFit/>
+            </a:bodyPr>
+            <a:lstStyle/>
+            <a:p>
+              <a:r>
+                <a:rPr lang="en-US" dirty="0" err="1"/>
+                <a:t>Cb</a:t>
+              </a:r>
+              <a:endParaRPr lang="en-US" dirty="0"/>
+            </a:p>
+          </p:txBody>
+        </p:sp>
+        <p:sp>
+          <p:nvSpPr>
+            <p:cNvPr id="44" name="TextBox 43">
+              <a:extLst>
+                <a:ext uri="{FF2B5EF4-FFF2-40B4-BE49-F238E27FC236}">
+                  <a16:creationId xmlns:a16="http://schemas.microsoft.com/office/drawing/2014/main" id="{213B495F-9D6C-134E-978B-51D6F8C9CBAB}"/>
+                </a:ext>
+              </a:extLst>
+            </p:cNvPr>
+            <p:cNvSpPr txBox="1"/>
+            <p:nvPr/>
+          </p:nvSpPr>
+          <p:spPr>
+            <a:xfrm>
+              <a:off x="5156111" y="4223120"/>
+              <a:ext cx="388248" cy="369332"/>
+            </a:xfrm>
+            <a:prstGeom prst="rect">
+              <a:avLst/>
+            </a:prstGeom>
+            <a:noFill/>
+          </p:spPr>
+          <p:txBody>
+            <a:bodyPr wrap="none" rtlCol="0">
+              <a:spAutoFit/>
+            </a:bodyPr>
+            <a:lstStyle/>
+            <a:p>
+              <a:r>
+                <a:rPr lang="en-US" dirty="0"/>
+                <a:t>Cr</a:t>
+              </a:r>
+            </a:p>
+          </p:txBody>
+        </p:sp>
+        <p:cxnSp>
+          <p:nvCxnSpPr>
+            <p:cNvPr id="46" name="Straight Arrow Connector 45">
+              <a:extLst>
+                <a:ext uri="{FF2B5EF4-FFF2-40B4-BE49-F238E27FC236}">
+                  <a16:creationId xmlns:a16="http://schemas.microsoft.com/office/drawing/2014/main" id="{42B0EE07-2D5C-7C4D-A107-69170A88DA52}"/>
+                </a:ext>
+              </a:extLst>
+            </p:cNvPr>
+            <p:cNvCxnSpPr/>
+            <p:nvPr/>
+          </p:nvCxnSpPr>
+          <p:spPr>
+            <a:xfrm>
+              <a:off x="2495773" y="4758267"/>
+              <a:ext cx="462579" cy="0"/>
+            </a:xfrm>
+            <a:prstGeom prst="straightConnector1">
+              <a:avLst/>
+            </a:prstGeom>
+            <a:ln>
+              <a:tailEnd type="triangle"/>
+            </a:ln>
+          </p:spPr>
+          <p:style>
+            <a:lnRef idx="1">
+              <a:schemeClr val="accent1"/>
+            </a:lnRef>
+            <a:fillRef idx="0">
+              <a:schemeClr val="accent1"/>
+            </a:fillRef>
+            <a:effectRef idx="0">
+              <a:schemeClr val="accent1"/>
+            </a:effectRef>
+            <a:fontRef idx="minor">
+              <a:schemeClr val="tx1"/>
+            </a:fontRef>
+          </p:style>
+        </p:cxnSp>
+      </p:grpSp>
+    </p:spTree>
+    <p:extLst>
+      <p:ext uri="{BB962C8B-B14F-4D97-AF65-F5344CB8AC3E}">
+        <p14:creationId xmlns:p14="http://schemas.microsoft.com/office/powerpoint/2010/main" val="727218379"/>
+      </p:ext>
+    </p:extLst>
+  </p:cSld>
+  <p:clrMapOvr>
+    <a:masterClrMapping/>
+  </p:clrMapOvr>
+</p:sld>
+</file>
+
+<file path=ppt/slides/slide7.xml><?xml version="1.0" encoding="utf-8"?>
+<p:sld xmlns:a="http://schemas.openxmlformats.org/drawingml/2006/main" xmlns:r="http://schemas.openxmlformats.org/officeDocument/2006/relationships" xmlns:p="http://schemas.openxmlformats.org/presentationml/2006/main">
+  <p:cSld>
+    <p:spTree>
+      <p:nvGrpSpPr>
+        <p:cNvPr id="1" name=""/>
+        <p:cNvGrpSpPr/>
+        <p:nvPr/>
+      </p:nvGrpSpPr>
+      <p:grpSpPr>
+        <a:xfrm>
+          <a:off x="0" y="0"/>
+          <a:ext cx="0" cy="0"/>
+          <a:chOff x="0" y="0"/>
+          <a:chExt cx="0" cy="0"/>
+        </a:xfrm>
+      </p:grpSpPr>
+      <p:sp>
+        <p:nvSpPr>
+          <p:cNvPr id="2" name="Title 1">
+            <a:extLst>
+              <a:ext uri="{FF2B5EF4-FFF2-40B4-BE49-F238E27FC236}">
+                <a16:creationId xmlns:a16="http://schemas.microsoft.com/office/drawing/2014/main" id="{201AFE33-9BB5-734A-BC5D-054F63889C84}"/>
+              </a:ext>
+            </a:extLst>
+          </p:cNvPr>
+          <p:cNvSpPr>
+            <a:spLocks noGrp="1"/>
+          </p:cNvSpPr>
+          <p:nvPr>
+            <p:ph type="title"/>
+          </p:nvPr>
+        </p:nvSpPr>
+        <p:spPr/>
+        <p:txBody>
+          <a:bodyPr/>
+          <a:lstStyle/>
+          <a:p>
+            <a:r>
+              <a:rPr lang="en-US" dirty="0"/>
+              <a:t>Forward Discrete Cosine Transform</a:t>
+            </a:r>
+          </a:p>
+        </p:txBody>
+      </p:sp>
+      <mc:AlternateContent xmlns:mc="http://schemas.openxmlformats.org/markup-compatibility/2006">
+        <mc:Choice xmlns:a14="http://schemas.microsoft.com/office/drawing/2010/main" Requires="a14">
+          <p:sp>
+            <p:nvSpPr>
+              <p:cNvPr id="3" name="Content Placeholder 2">
+                <a:extLst>
+                  <a:ext uri="{FF2B5EF4-FFF2-40B4-BE49-F238E27FC236}">
+                    <a16:creationId xmlns:a16="http://schemas.microsoft.com/office/drawing/2014/main" id="{29138FC3-5495-7B45-8A7E-673358D3C6B8}"/>
+                  </a:ext>
+                </a:extLst>
+              </p:cNvPr>
+              <p:cNvSpPr>
+                <a:spLocks noGrp="1"/>
+              </p:cNvSpPr>
+              <p:nvPr>
+                <p:ph idx="1"/>
+              </p:nvPr>
+            </p:nvSpPr>
+            <p:spPr/>
+            <p:txBody>
+              <a:bodyPr>
+                <a:normAutofit/>
+              </a:bodyPr>
+              <a:lstStyle/>
+              <a:p>
+                <a:r>
+                  <a:rPr lang="en-US" dirty="0"/>
+                  <a:t>A Frequency domain transform</a:t>
+                </a:r>
+              </a:p>
+              <a:p>
+                <a14:m>
+                  <m:oMath xmlns:m="http://schemas.openxmlformats.org/officeDocument/2006/math">
+                    <m:sSub>
+                      <m:sSubPr>
+                        <m:ctrlPr>
+                          <a:rPr lang="en-US" i="1" smtClean="0">
+                            <a:latin typeface="Cambria Math" panose="02040503050406030204" pitchFamily="18" charset="0"/>
+                          </a:rPr>
+                        </m:ctrlPr>
+                      </m:sSubPr>
+                      <m:e>
+                        <m:r>
+                          <a:rPr lang="en-US" b="0" i="1" smtClean="0">
+                            <a:latin typeface="Cambria Math" panose="02040503050406030204" pitchFamily="18" charset="0"/>
+                          </a:rPr>
+                          <m:t>𝐺</m:t>
+                        </m:r>
+                      </m:e>
+                      <m:sub>
+                        <m:r>
+                          <a:rPr lang="en-US" b="0" i="1" smtClean="0">
+                            <a:latin typeface="Cambria Math" panose="02040503050406030204" pitchFamily="18" charset="0"/>
+                          </a:rPr>
+                          <m:t>𝑢</m:t>
+                        </m:r>
+                        <m:r>
+                          <a:rPr lang="en-US" b="0" i="1" smtClean="0">
+                            <a:latin typeface="Cambria Math" panose="02040503050406030204" pitchFamily="18" charset="0"/>
+                          </a:rPr>
+                          <m:t>,</m:t>
+                        </m:r>
+                        <m:r>
+                          <a:rPr lang="en-US" b="0" i="1" smtClean="0">
+                            <a:latin typeface="Cambria Math" panose="02040503050406030204" pitchFamily="18" charset="0"/>
+                          </a:rPr>
+                          <m:t>𝑣</m:t>
+                        </m:r>
+                      </m:sub>
+                    </m:sSub>
+                    <m:r>
+                      <a:rPr lang="en-US" b="0" i="1" smtClean="0">
+                        <a:latin typeface="Cambria Math" panose="02040503050406030204" pitchFamily="18" charset="0"/>
+                      </a:rPr>
+                      <m:t>=</m:t>
+                    </m:r>
+                    <m:f>
+                      <m:fPr>
+                        <m:ctrlPr>
+                          <a:rPr lang="en-US" i="1" smtClean="0">
+                            <a:latin typeface="Cambria Math" panose="02040503050406030204" pitchFamily="18" charset="0"/>
+                          </a:rPr>
+                        </m:ctrlPr>
+                      </m:fPr>
+                      <m:num>
+                        <m:r>
+                          <a:rPr lang="en-US" b="0" i="1" smtClean="0">
+                            <a:latin typeface="Cambria Math" panose="02040503050406030204" pitchFamily="18" charset="0"/>
+                          </a:rPr>
+                          <m:t>1</m:t>
+                        </m:r>
+                      </m:num>
+                      <m:den>
+                        <m:r>
+                          <a:rPr lang="en-US" b="0" i="1" smtClean="0">
+                            <a:latin typeface="Cambria Math" panose="02040503050406030204" pitchFamily="18" charset="0"/>
+                          </a:rPr>
+                          <m:t>4</m:t>
+                        </m:r>
+                      </m:den>
+                    </m:f>
+                    <m:r>
+                      <a:rPr lang="en-US" i="1" smtClean="0">
+                        <a:latin typeface="Cambria Math" panose="02040503050406030204" pitchFamily="18" charset="0"/>
+                        <a:ea typeface="Cambria Math" panose="02040503050406030204" pitchFamily="18" charset="0"/>
+                      </a:rPr>
+                      <m:t>𝛼</m:t>
+                    </m:r>
+                    <m:d>
+                      <m:dPr>
+                        <m:ctrlPr>
+                          <a:rPr lang="en-US" b="0" i="1" smtClean="0">
+                            <a:latin typeface="Cambria Math" panose="02040503050406030204" pitchFamily="18" charset="0"/>
+                            <a:ea typeface="Cambria Math" panose="02040503050406030204" pitchFamily="18" charset="0"/>
+                          </a:rPr>
+                        </m:ctrlPr>
+                      </m:dPr>
+                      <m:e>
+                        <m:r>
+                          <a:rPr lang="en-US" b="0" i="1" smtClean="0">
+                            <a:latin typeface="Cambria Math" panose="02040503050406030204" pitchFamily="18" charset="0"/>
+                            <a:ea typeface="Cambria Math" panose="02040503050406030204" pitchFamily="18" charset="0"/>
+                          </a:rPr>
+                          <m:t>𝑢</m:t>
+                        </m:r>
+                      </m:e>
+                    </m:d>
+                    <m:r>
+                      <a:rPr lang="en-US" i="1">
+                        <a:latin typeface="Cambria Math" panose="02040503050406030204" pitchFamily="18" charset="0"/>
+                        <a:ea typeface="Cambria Math" panose="02040503050406030204" pitchFamily="18" charset="0"/>
+                      </a:rPr>
+                      <m:t>𝛼</m:t>
+                    </m:r>
+                    <m:d>
+                      <m:dPr>
+                        <m:ctrlPr>
+                          <a:rPr lang="en-US" b="0" i="1" smtClean="0">
+                            <a:latin typeface="Cambria Math" panose="02040503050406030204" pitchFamily="18" charset="0"/>
+                            <a:ea typeface="Cambria Math" panose="02040503050406030204" pitchFamily="18" charset="0"/>
+                          </a:rPr>
+                        </m:ctrlPr>
+                      </m:dPr>
+                      <m:e>
+                        <m:r>
+                          <a:rPr lang="en-US" b="0" i="1" smtClean="0">
+                            <a:latin typeface="Cambria Math" panose="02040503050406030204" pitchFamily="18" charset="0"/>
+                            <a:ea typeface="Cambria Math" panose="02040503050406030204" pitchFamily="18" charset="0"/>
+                          </a:rPr>
+                          <m:t>𝑣</m:t>
+                        </m:r>
+                      </m:e>
+                    </m:d>
+                    <m:nary>
+                      <m:naryPr>
+                        <m:chr m:val="∑"/>
+                        <m:ctrlPr>
+                          <a:rPr lang="en-US" b="0" i="1" smtClean="0">
+                            <a:latin typeface="Cambria Math" panose="02040503050406030204" pitchFamily="18" charset="0"/>
+                            <a:ea typeface="Cambria Math" panose="02040503050406030204" pitchFamily="18" charset="0"/>
+                          </a:rPr>
+                        </m:ctrlPr>
+                      </m:naryPr>
+                      <m:sub>
+                        <m:r>
+                          <m:rPr>
+                            <m:brk m:alnAt="23"/>
+                          </m:rPr>
+                          <a:rPr lang="en-US" b="0" i="1" smtClean="0">
+                            <a:latin typeface="Cambria Math" panose="02040503050406030204" pitchFamily="18" charset="0"/>
+                            <a:ea typeface="Cambria Math" panose="02040503050406030204" pitchFamily="18" charset="0"/>
+                          </a:rPr>
+                          <m:t>𝑥</m:t>
+                        </m:r>
+                        <m:r>
+                          <a:rPr lang="en-US" b="0" i="1" smtClean="0">
+                            <a:latin typeface="Cambria Math" panose="02040503050406030204" pitchFamily="18" charset="0"/>
+                            <a:ea typeface="Cambria Math" panose="02040503050406030204" pitchFamily="18" charset="0"/>
+                          </a:rPr>
+                          <m:t>=0</m:t>
+                        </m:r>
+                      </m:sub>
+                      <m:sup>
+                        <m:r>
+                          <a:rPr lang="en-US" b="0" i="1" smtClean="0">
+                            <a:latin typeface="Cambria Math" panose="02040503050406030204" pitchFamily="18" charset="0"/>
+                            <a:ea typeface="Cambria Math" panose="02040503050406030204" pitchFamily="18" charset="0"/>
+                          </a:rPr>
+                          <m:t>7</m:t>
+                        </m:r>
+                      </m:sup>
+                      <m:e>
+                        <m:nary>
+                          <m:naryPr>
+                            <m:chr m:val="∑"/>
+                            <m:ctrlPr>
+                              <a:rPr lang="en-US" b="0" i="1" smtClean="0">
+                                <a:latin typeface="Cambria Math" panose="02040503050406030204" pitchFamily="18" charset="0"/>
+                                <a:ea typeface="Cambria Math" panose="02040503050406030204" pitchFamily="18" charset="0"/>
+                              </a:rPr>
+                            </m:ctrlPr>
+                          </m:naryPr>
+                          <m:sub>
+                            <m:r>
+                              <m:rPr>
+                                <m:brk m:alnAt="23"/>
+                              </m:rPr>
+                              <a:rPr lang="en-US" b="0" i="1" smtClean="0">
+                                <a:latin typeface="Cambria Math" panose="02040503050406030204" pitchFamily="18" charset="0"/>
+                                <a:ea typeface="Cambria Math" panose="02040503050406030204" pitchFamily="18" charset="0"/>
+                              </a:rPr>
+                              <m:t>𝑦</m:t>
+                            </m:r>
+                            <m:r>
+                              <a:rPr lang="en-US" b="0" i="1" smtClean="0">
+                                <a:latin typeface="Cambria Math" panose="02040503050406030204" pitchFamily="18" charset="0"/>
+                                <a:ea typeface="Cambria Math" panose="02040503050406030204" pitchFamily="18" charset="0"/>
+                              </a:rPr>
+                              <m:t>=0</m:t>
+                            </m:r>
+                          </m:sub>
+                          <m:sup>
+                            <m:r>
+                              <a:rPr lang="en-US" b="0" i="1" smtClean="0">
+                                <a:latin typeface="Cambria Math" panose="02040503050406030204" pitchFamily="18" charset="0"/>
+                                <a:ea typeface="Cambria Math" panose="02040503050406030204" pitchFamily="18" charset="0"/>
+                              </a:rPr>
+                              <m:t>7</m:t>
+                            </m:r>
+                          </m:sup>
+                          <m:e>
+                            <m:sSub>
+                              <m:sSubPr>
+                                <m:ctrlPr>
+                                  <a:rPr lang="en-US" b="0" i="1" smtClean="0">
+                                    <a:latin typeface="Cambria Math" panose="02040503050406030204" pitchFamily="18" charset="0"/>
+                                    <a:ea typeface="Cambria Math" panose="02040503050406030204" pitchFamily="18" charset="0"/>
+                                  </a:rPr>
+                                </m:ctrlPr>
+                              </m:sSubPr>
+                              <m:e>
+                                <m:r>
+                                  <a:rPr lang="en-US" b="0" i="1" smtClean="0">
+                                    <a:latin typeface="Cambria Math" panose="02040503050406030204" pitchFamily="18" charset="0"/>
+                                    <a:ea typeface="Cambria Math" panose="02040503050406030204" pitchFamily="18" charset="0"/>
+                                  </a:rPr>
+                                  <m:t>𝑔</m:t>
+                                </m:r>
+                              </m:e>
+                              <m:sub>
+                                <m:r>
+                                  <a:rPr lang="en-US" b="0" i="1" smtClean="0">
+                                    <a:latin typeface="Cambria Math" panose="02040503050406030204" pitchFamily="18" charset="0"/>
+                                    <a:ea typeface="Cambria Math" panose="02040503050406030204" pitchFamily="18" charset="0"/>
+                                  </a:rPr>
+                                  <m:t>𝑥</m:t>
+                                </m:r>
+                                <m:r>
+                                  <a:rPr lang="en-US" b="0" i="1" smtClean="0">
+                                    <a:latin typeface="Cambria Math" panose="02040503050406030204" pitchFamily="18" charset="0"/>
+                                    <a:ea typeface="Cambria Math" panose="02040503050406030204" pitchFamily="18" charset="0"/>
+                                  </a:rPr>
+                                  <m:t>,</m:t>
+                                </m:r>
+                                <m:r>
+                                  <a:rPr lang="en-US" b="0" i="1" smtClean="0">
+                                    <a:latin typeface="Cambria Math" panose="02040503050406030204" pitchFamily="18" charset="0"/>
+                                    <a:ea typeface="Cambria Math" panose="02040503050406030204" pitchFamily="18" charset="0"/>
+                                  </a:rPr>
+                                  <m:t>𝑦</m:t>
+                                </m:r>
+                              </m:sub>
+                            </m:sSub>
+                            <m:r>
+                              <a:rPr lang="en-US" b="0" i="1" smtClean="0">
+                                <a:latin typeface="Cambria Math" panose="02040503050406030204" pitchFamily="18" charset="0"/>
+                                <a:ea typeface="Cambria Math" panose="02040503050406030204" pitchFamily="18" charset="0"/>
+                              </a:rPr>
+                              <m:t>𝑐𝑜𝑠</m:t>
+                            </m:r>
+                            <m:d>
+                              <m:dPr>
+                                <m:begChr m:val="["/>
+                                <m:endChr m:val="]"/>
+                                <m:ctrlPr>
+                                  <a:rPr lang="en-US" b="0" i="1" smtClean="0">
+                                    <a:latin typeface="Cambria Math" panose="02040503050406030204" pitchFamily="18" charset="0"/>
+                                    <a:ea typeface="Cambria Math" panose="02040503050406030204" pitchFamily="18" charset="0"/>
+                                  </a:rPr>
+                                </m:ctrlPr>
+                              </m:dPr>
+                              <m:e>
+                                <m:f>
+                                  <m:fPr>
+                                    <m:ctrlPr>
+                                      <a:rPr lang="en-US" b="0" i="1" smtClean="0">
+                                        <a:latin typeface="Cambria Math" panose="02040503050406030204" pitchFamily="18" charset="0"/>
+                                        <a:ea typeface="Cambria Math" panose="02040503050406030204" pitchFamily="18" charset="0"/>
+                                      </a:rPr>
+                                    </m:ctrlPr>
+                                  </m:fPr>
+                                  <m:num>
+                                    <m:d>
+                                      <m:dPr>
+                                        <m:ctrlPr>
+                                          <a:rPr lang="en-US" b="0" i="1" smtClean="0">
+                                            <a:latin typeface="Cambria Math" panose="02040503050406030204" pitchFamily="18" charset="0"/>
+                                            <a:ea typeface="Cambria Math" panose="02040503050406030204" pitchFamily="18" charset="0"/>
+                                          </a:rPr>
+                                        </m:ctrlPr>
+                                      </m:dPr>
+                                      <m:e>
+                                        <m:r>
+                                          <a:rPr lang="en-US" b="0" i="1" smtClean="0">
+                                            <a:latin typeface="Cambria Math" panose="02040503050406030204" pitchFamily="18" charset="0"/>
+                                            <a:ea typeface="Cambria Math" panose="02040503050406030204" pitchFamily="18" charset="0"/>
+                                          </a:rPr>
+                                          <m:t>2</m:t>
+                                        </m:r>
+                                        <m:r>
+                                          <a:rPr lang="en-US" b="0" i="1" smtClean="0">
+                                            <a:latin typeface="Cambria Math" panose="02040503050406030204" pitchFamily="18" charset="0"/>
+                                            <a:ea typeface="Cambria Math" panose="02040503050406030204" pitchFamily="18" charset="0"/>
+                                          </a:rPr>
+                                          <m:t>𝑥</m:t>
+                                        </m:r>
+                                        <m:r>
+                                          <a:rPr lang="en-US" b="0" i="1" smtClean="0">
+                                            <a:latin typeface="Cambria Math" panose="02040503050406030204" pitchFamily="18" charset="0"/>
+                                            <a:ea typeface="Cambria Math" panose="02040503050406030204" pitchFamily="18" charset="0"/>
+                                          </a:rPr>
+                                          <m:t>+1</m:t>
+                                        </m:r>
+                                      </m:e>
+                                    </m:d>
+                                    <m:r>
+                                      <a:rPr lang="en-US" b="0" i="1" smtClean="0">
+                                        <a:latin typeface="Cambria Math" panose="02040503050406030204" pitchFamily="18" charset="0"/>
+                                        <a:ea typeface="Cambria Math" panose="02040503050406030204" pitchFamily="18" charset="0"/>
+                                      </a:rPr>
+                                      <m:t>𝑢</m:t>
+                                    </m:r>
+                                    <m:r>
+                                      <a:rPr lang="en-US" b="0" i="1" smtClean="0">
+                                        <a:latin typeface="Cambria Math" panose="02040503050406030204" pitchFamily="18" charset="0"/>
+                                        <a:ea typeface="Cambria Math" panose="02040503050406030204" pitchFamily="18" charset="0"/>
+                                      </a:rPr>
+                                      <m:t>𝜋</m:t>
+                                    </m:r>
+                                  </m:num>
+                                  <m:den>
+                                    <m:r>
+                                      <a:rPr lang="en-US" b="0" i="1" smtClean="0">
+                                        <a:latin typeface="Cambria Math" panose="02040503050406030204" pitchFamily="18" charset="0"/>
+                                        <a:ea typeface="Cambria Math" panose="02040503050406030204" pitchFamily="18" charset="0"/>
+                                      </a:rPr>
+                                      <m:t>16</m:t>
+                                    </m:r>
+                                  </m:den>
+                                </m:f>
+                              </m:e>
+                            </m:d>
+                            <m:r>
+                              <a:rPr lang="en-US" i="1">
+                                <a:latin typeface="Cambria Math" panose="02040503050406030204" pitchFamily="18" charset="0"/>
+                                <a:ea typeface="Cambria Math" panose="02040503050406030204" pitchFamily="18" charset="0"/>
+                              </a:rPr>
+                              <m:t>𝑐𝑜𝑠</m:t>
+                            </m:r>
+                            <m:d>
+                              <m:dPr>
+                                <m:begChr m:val="["/>
+                                <m:endChr m:val="]"/>
+                                <m:ctrlPr>
+                                  <a:rPr lang="en-US" i="1">
+                                    <a:latin typeface="Cambria Math" panose="02040503050406030204" pitchFamily="18" charset="0"/>
+                                    <a:ea typeface="Cambria Math" panose="02040503050406030204" pitchFamily="18" charset="0"/>
+                                  </a:rPr>
+                                </m:ctrlPr>
+                              </m:dPr>
+                              <m:e>
+                                <m:f>
+                                  <m:fPr>
+                                    <m:ctrlPr>
+                                      <a:rPr lang="en-US" i="1">
+                                        <a:latin typeface="Cambria Math" panose="02040503050406030204" pitchFamily="18" charset="0"/>
+                                        <a:ea typeface="Cambria Math" panose="02040503050406030204" pitchFamily="18" charset="0"/>
+                                      </a:rPr>
+                                    </m:ctrlPr>
+                                  </m:fPr>
+                                  <m:num>
+                                    <m:d>
+                                      <m:dPr>
+                                        <m:ctrlPr>
+                                          <a:rPr lang="en-US" i="1">
+                                            <a:latin typeface="Cambria Math" panose="02040503050406030204" pitchFamily="18" charset="0"/>
+                                            <a:ea typeface="Cambria Math" panose="02040503050406030204" pitchFamily="18" charset="0"/>
+                                          </a:rPr>
+                                        </m:ctrlPr>
+                                      </m:dPr>
+                                      <m:e>
+                                        <m:r>
+                                          <a:rPr lang="en-US" i="1">
+                                            <a:latin typeface="Cambria Math" panose="02040503050406030204" pitchFamily="18" charset="0"/>
+                                            <a:ea typeface="Cambria Math" panose="02040503050406030204" pitchFamily="18" charset="0"/>
+                                          </a:rPr>
+                                          <m:t>2</m:t>
+                                        </m:r>
+                                        <m:r>
+                                          <a:rPr lang="en-US" b="0" i="1" smtClean="0">
+                                            <a:latin typeface="Cambria Math" panose="02040503050406030204" pitchFamily="18" charset="0"/>
+                                            <a:ea typeface="Cambria Math" panose="02040503050406030204" pitchFamily="18" charset="0"/>
+                                          </a:rPr>
+                                          <m:t>𝑦</m:t>
+                                        </m:r>
+                                        <m:r>
+                                          <a:rPr lang="en-US" i="1">
+                                            <a:latin typeface="Cambria Math" panose="02040503050406030204" pitchFamily="18" charset="0"/>
+                                            <a:ea typeface="Cambria Math" panose="02040503050406030204" pitchFamily="18" charset="0"/>
+                                          </a:rPr>
+                                          <m:t>+1</m:t>
+                                        </m:r>
+                                      </m:e>
+                                    </m:d>
+                                    <m:r>
+                                      <a:rPr lang="en-US" i="1">
+                                        <a:latin typeface="Cambria Math" panose="02040503050406030204" pitchFamily="18" charset="0"/>
+                                        <a:ea typeface="Cambria Math" panose="02040503050406030204" pitchFamily="18" charset="0"/>
+                                      </a:rPr>
+                                      <m:t>𝑢</m:t>
+                                    </m:r>
+                                    <m:r>
+                                      <a:rPr lang="en-US" i="1">
+                                        <a:latin typeface="Cambria Math" panose="02040503050406030204" pitchFamily="18" charset="0"/>
+                                        <a:ea typeface="Cambria Math" panose="02040503050406030204" pitchFamily="18" charset="0"/>
+                                      </a:rPr>
+                                      <m:t>𝜋</m:t>
+                                    </m:r>
+                                  </m:num>
+                                  <m:den>
+                                    <m:r>
+                                      <a:rPr lang="en-US" i="1">
+                                        <a:latin typeface="Cambria Math" panose="02040503050406030204" pitchFamily="18" charset="0"/>
+                                        <a:ea typeface="Cambria Math" panose="02040503050406030204" pitchFamily="18" charset="0"/>
+                                      </a:rPr>
+                                      <m:t>16</m:t>
+                                    </m:r>
+                                  </m:den>
+                                </m:f>
+                              </m:e>
+                            </m:d>
+                          </m:e>
+                        </m:nary>
+                      </m:e>
+                    </m:nary>
+                  </m:oMath>
+                </a14:m>
+                <a:endParaRPr lang="en-US" b="0" dirty="0">
+                  <a:ea typeface="Cambria Math" panose="02040503050406030204" pitchFamily="18" charset="0"/>
+                </a:endParaRPr>
+              </a:p>
+              <a:p>
+                <a:pPr lvl="1"/>
+                <a14:m>
+                  <m:oMath xmlns:m="http://schemas.openxmlformats.org/officeDocument/2006/math">
+                    <m:r>
+                      <a:rPr lang="en-US" i="1">
+                        <a:latin typeface="Cambria Math" panose="02040503050406030204" pitchFamily="18" charset="0"/>
+                        <a:ea typeface="Cambria Math" panose="02040503050406030204" pitchFamily="18" charset="0"/>
+                      </a:rPr>
+                      <m:t>𝑢</m:t>
+                    </m:r>
+                  </m:oMath>
+                </a14:m>
+                <a:r>
+                  <a:rPr lang="en-US" dirty="0"/>
+                  <a:t>: horizontal</a:t>
+                </a:r>
+              </a:p>
+              <a:p>
+                <a:pPr lvl="1"/>
+                <a14:m>
+                  <m:oMath xmlns:m="http://schemas.openxmlformats.org/officeDocument/2006/math">
+                    <m:r>
+                      <a:rPr lang="en-US" i="1">
+                        <a:latin typeface="Cambria Math" panose="02040503050406030204" pitchFamily="18" charset="0"/>
+                        <a:ea typeface="Cambria Math" panose="02040503050406030204" pitchFamily="18" charset="0"/>
+                      </a:rPr>
+                      <m:t>𝑣</m:t>
+                    </m:r>
+                  </m:oMath>
+                </a14:m>
+                <a:r>
+                  <a:rPr lang="en-US" dirty="0"/>
+                  <a:t>: vertical</a:t>
+                </a:r>
+              </a:p>
+              <a:p>
+                <a:pPr lvl="1"/>
+                <a14:m>
+                  <m:oMath xmlns:m="http://schemas.openxmlformats.org/officeDocument/2006/math">
+                    <m:r>
+                      <a:rPr lang="en-US" i="1">
+                        <a:latin typeface="Cambria Math" panose="02040503050406030204" pitchFamily="18" charset="0"/>
+                        <a:ea typeface="Cambria Math" panose="02040503050406030204" pitchFamily="18" charset="0"/>
+                      </a:rPr>
+                      <m:t>𝛼</m:t>
+                    </m:r>
+                    <m:d>
+                      <m:dPr>
+                        <m:ctrlPr>
+                          <a:rPr lang="en-US" i="1">
+                            <a:latin typeface="Cambria Math" panose="02040503050406030204" pitchFamily="18" charset="0"/>
+                            <a:ea typeface="Cambria Math" panose="02040503050406030204" pitchFamily="18" charset="0"/>
+                          </a:rPr>
+                        </m:ctrlPr>
+                      </m:dPr>
+                      <m:e>
+                        <m:r>
+                          <a:rPr lang="en-US" i="1">
+                            <a:latin typeface="Cambria Math" panose="02040503050406030204" pitchFamily="18" charset="0"/>
+                            <a:ea typeface="Cambria Math" panose="02040503050406030204" pitchFamily="18" charset="0"/>
+                          </a:rPr>
+                          <m:t>𝑢</m:t>
+                        </m:r>
+                      </m:e>
+                    </m:d>
+                    <m:r>
+                      <a:rPr lang="en-US" b="0" i="0" smtClean="0">
+                        <a:latin typeface="Cambria Math" panose="02040503050406030204" pitchFamily="18" charset="0"/>
+                        <a:ea typeface="Cambria Math" panose="02040503050406030204" pitchFamily="18" charset="0"/>
+                      </a:rPr>
+                      <m:t>=</m:t>
+                    </m:r>
+                    <m:d>
+                      <m:dPr>
+                        <m:begChr m:val="{"/>
+                        <m:endChr m:val=""/>
+                        <m:ctrlPr>
+                          <a:rPr lang="en-US" b="0" i="1" smtClean="0">
+                            <a:latin typeface="Cambria Math" panose="02040503050406030204" pitchFamily="18" charset="0"/>
+                            <a:ea typeface="Cambria Math" panose="02040503050406030204" pitchFamily="18" charset="0"/>
+                          </a:rPr>
+                        </m:ctrlPr>
+                      </m:dPr>
+                      <m:e>
+                        <m:eqArr>
+                          <m:eqArrPr>
+                            <m:ctrlPr>
+                              <a:rPr lang="en-US" b="0" i="1" smtClean="0">
+                                <a:latin typeface="Cambria Math" panose="02040503050406030204" pitchFamily="18" charset="0"/>
+                                <a:ea typeface="Cambria Math" panose="02040503050406030204" pitchFamily="18" charset="0"/>
+                              </a:rPr>
+                            </m:ctrlPr>
+                          </m:eqArrPr>
+                          <m:e>
+                            <m:f>
+                              <m:fPr>
+                                <m:ctrlPr>
+                                  <a:rPr lang="en-US" b="0" i="1" smtClean="0">
+                                    <a:latin typeface="Cambria Math" panose="02040503050406030204" pitchFamily="18" charset="0"/>
+                                    <a:ea typeface="Cambria Math" panose="02040503050406030204" pitchFamily="18" charset="0"/>
+                                  </a:rPr>
+                                </m:ctrlPr>
+                              </m:fPr>
+                              <m:num>
+                                <m:r>
+                                  <a:rPr lang="en-US" b="0" i="1" smtClean="0">
+                                    <a:latin typeface="Cambria Math" panose="02040503050406030204" pitchFamily="18" charset="0"/>
+                                    <a:ea typeface="Cambria Math" panose="02040503050406030204" pitchFamily="18" charset="0"/>
+                                  </a:rPr>
+                                  <m:t>1</m:t>
+                                </m:r>
+                              </m:num>
+                              <m:den>
+                                <m:rad>
+                                  <m:radPr>
+                                    <m:degHide m:val="on"/>
+                                    <m:ctrlPr>
+                                      <a:rPr lang="en-US" b="0" i="1" smtClean="0">
+                                        <a:latin typeface="Cambria Math" panose="02040503050406030204" pitchFamily="18" charset="0"/>
+                                        <a:ea typeface="Cambria Math" panose="02040503050406030204" pitchFamily="18" charset="0"/>
+                                      </a:rPr>
+                                    </m:ctrlPr>
+                                  </m:radPr>
+                                  <m:deg/>
+                                  <m:e>
+                                    <m:r>
+                                      <a:rPr lang="en-US" b="0" i="1" smtClean="0">
+                                        <a:latin typeface="Cambria Math" panose="02040503050406030204" pitchFamily="18" charset="0"/>
+                                        <a:ea typeface="Cambria Math" panose="02040503050406030204" pitchFamily="18" charset="0"/>
+                                      </a:rPr>
+                                      <m:t>2</m:t>
+                                    </m:r>
+                                  </m:e>
+                                </m:rad>
+                              </m:den>
+                            </m:f>
+                            <m:r>
+                              <a:rPr lang="en-US" b="0" i="1" smtClean="0">
+                                <a:latin typeface="Cambria Math" panose="02040503050406030204" pitchFamily="18" charset="0"/>
+                                <a:ea typeface="Cambria Math" panose="02040503050406030204" pitchFamily="18" charset="0"/>
+                              </a:rPr>
+                              <m:t>,         </m:t>
+                            </m:r>
+                            <m:r>
+                              <a:rPr lang="en-US" b="0" i="1" smtClean="0">
+                                <a:latin typeface="Cambria Math" panose="02040503050406030204" pitchFamily="18" charset="0"/>
+                                <a:ea typeface="Cambria Math" panose="02040503050406030204" pitchFamily="18" charset="0"/>
+                              </a:rPr>
+                              <m:t>𝑢</m:t>
+                            </m:r>
+                            <m:r>
+                              <a:rPr lang="en-US" b="0" i="1" smtClean="0">
+                                <a:latin typeface="Cambria Math" panose="02040503050406030204" pitchFamily="18" charset="0"/>
+                                <a:ea typeface="Cambria Math" panose="02040503050406030204" pitchFamily="18" charset="0"/>
+                              </a:rPr>
+                              <m:t>=0</m:t>
+                            </m:r>
+                          </m:e>
+                          <m:e>
+                            <m:r>
+                              <a:rPr lang="en-US" b="0" i="1" smtClean="0">
+                                <a:latin typeface="Cambria Math" panose="02040503050406030204" pitchFamily="18" charset="0"/>
+                                <a:ea typeface="Cambria Math" panose="02040503050406030204" pitchFamily="18" charset="0"/>
+                              </a:rPr>
+                              <m:t>1, </m:t>
+                            </m:r>
+                            <m:r>
+                              <a:rPr lang="en-US" b="0" i="1" smtClean="0">
+                                <a:latin typeface="Cambria Math" panose="02040503050406030204" pitchFamily="18" charset="0"/>
+                                <a:ea typeface="Cambria Math" panose="02040503050406030204" pitchFamily="18" charset="0"/>
+                              </a:rPr>
+                              <m:t>𝑜𝑡h𝑒𝑟𝑤𝑖𝑠𝑒</m:t>
+                            </m:r>
+                          </m:e>
+                        </m:eqArr>
+                      </m:e>
+                    </m:d>
+                  </m:oMath>
+                </a14:m>
+                <a:endParaRPr lang="en-US" dirty="0"/>
+              </a:p>
+              <a:p>
+                <a:pPr lvl="1"/>
+                <a14:m>
+                  <m:oMath xmlns:m="http://schemas.openxmlformats.org/officeDocument/2006/math">
+                    <m:sSub>
+                      <m:sSubPr>
+                        <m:ctrlPr>
+                          <a:rPr lang="en-US" i="1">
+                            <a:latin typeface="Cambria Math" panose="02040503050406030204" pitchFamily="18" charset="0"/>
+                            <a:ea typeface="Cambria Math" panose="02040503050406030204" pitchFamily="18" charset="0"/>
+                          </a:rPr>
+                        </m:ctrlPr>
+                      </m:sSubPr>
+                      <m:e>
+                        <m:r>
+                          <a:rPr lang="en-US" i="1">
+                            <a:latin typeface="Cambria Math" panose="02040503050406030204" pitchFamily="18" charset="0"/>
+                            <a:ea typeface="Cambria Math" panose="02040503050406030204" pitchFamily="18" charset="0"/>
+                          </a:rPr>
+                          <m:t>𝑔</m:t>
+                        </m:r>
+                      </m:e>
+                      <m:sub>
+                        <m:r>
+                          <a:rPr lang="en-US" i="1">
+                            <a:latin typeface="Cambria Math" panose="02040503050406030204" pitchFamily="18" charset="0"/>
+                            <a:ea typeface="Cambria Math" panose="02040503050406030204" pitchFamily="18" charset="0"/>
+                          </a:rPr>
+                          <m:t>𝑥</m:t>
+                        </m:r>
+                        <m:r>
+                          <a:rPr lang="en-US" i="1">
+                            <a:latin typeface="Cambria Math" panose="02040503050406030204" pitchFamily="18" charset="0"/>
+                            <a:ea typeface="Cambria Math" panose="02040503050406030204" pitchFamily="18" charset="0"/>
+                          </a:rPr>
+                          <m:t>,</m:t>
+                        </m:r>
+                        <m:r>
+                          <a:rPr lang="en-US" i="1">
+                            <a:latin typeface="Cambria Math" panose="02040503050406030204" pitchFamily="18" charset="0"/>
+                            <a:ea typeface="Cambria Math" panose="02040503050406030204" pitchFamily="18" charset="0"/>
+                          </a:rPr>
+                          <m:t>𝑦</m:t>
+                        </m:r>
+                      </m:sub>
+                    </m:sSub>
+                  </m:oMath>
+                </a14:m>
+                <a:r>
+                  <a:rPr lang="en-US" dirty="0"/>
+                  <a:t>: pixel value at coordinates (</a:t>
+                </a:r>
+                <a14:m>
+                  <m:oMath xmlns:m="http://schemas.openxmlformats.org/officeDocument/2006/math">
+                    <m:r>
+                      <a:rPr lang="en-US" i="1">
+                        <a:latin typeface="Cambria Math" panose="02040503050406030204" pitchFamily="18" charset="0"/>
+                        <a:ea typeface="Cambria Math" panose="02040503050406030204" pitchFamily="18" charset="0"/>
+                      </a:rPr>
+                      <m:t>𝑥</m:t>
+                    </m:r>
+                    <m:r>
+                      <a:rPr lang="en-US" i="1">
+                        <a:latin typeface="Cambria Math" panose="02040503050406030204" pitchFamily="18" charset="0"/>
+                        <a:ea typeface="Cambria Math" panose="02040503050406030204" pitchFamily="18" charset="0"/>
+                      </a:rPr>
+                      <m:t>,</m:t>
+                    </m:r>
+                    <m:r>
+                      <a:rPr lang="en-US" i="1">
+                        <a:latin typeface="Cambria Math" panose="02040503050406030204" pitchFamily="18" charset="0"/>
+                        <a:ea typeface="Cambria Math" panose="02040503050406030204" pitchFamily="18" charset="0"/>
+                      </a:rPr>
+                      <m:t>𝑦</m:t>
+                    </m:r>
+                  </m:oMath>
+                </a14:m>
+                <a:r>
+                  <a:rPr lang="en-US" dirty="0"/>
+                  <a:t>)</a:t>
+                </a:r>
+              </a:p>
+              <a:p>
+                <a:r>
+                  <a:rPr lang="en-US" dirty="0"/>
+                  <a:t>(0,0) is called the DC coefficient, rest are the AC coefficient</a:t>
+                </a:r>
+              </a:p>
+              <a:p>
+                <a:pPr marL="457200" lvl="1" indent="0">
+                  <a:buNone/>
+                </a:pPr>
+                <a:endParaRPr lang="en-US" dirty="0"/>
+              </a:p>
+            </p:txBody>
+          </p:sp>
+        </mc:Choice>
+        <mc:Fallback>
+          <p:sp>
+            <p:nvSpPr>
+              <p:cNvPr id="3" name="Content Placeholder 2">
+                <a:extLst>
+                  <a:ext uri="{FF2B5EF4-FFF2-40B4-BE49-F238E27FC236}">
+                    <a16:creationId xmlns:a16="http://schemas.microsoft.com/office/drawing/2014/main" id="{29138FC3-5495-7B45-8A7E-673358D3C6B8}"/>
+                  </a:ext>
+                </a:extLst>
+              </p:cNvPr>
+              <p:cNvSpPr>
+                <a:spLocks noGrp="1" noRot="1" noChangeAspect="1" noMove="1" noResize="1" noEditPoints="1" noAdjustHandles="1" noChangeArrowheads="1" noChangeShapeType="1" noTextEdit="1"/>
+              </p:cNvSpPr>
+              <p:nvPr>
+                <p:ph idx="1"/>
+              </p:nvPr>
+            </p:nvSpPr>
+            <p:spPr>
+              <a:blipFill>
+                <a:blip r:embed="rId2"/>
+                <a:stretch>
+                  <a:fillRect l="-4101" t="-19883" b="-60234"/>
+                </a:stretch>
+              </a:blipFill>
+            </p:spPr>
+            <p:txBody>
+              <a:bodyPr/>
+              <a:lstStyle/>
+              <a:p>
+                <a:r>
+                  <a:rPr lang="en-US">
+                    <a:noFill/>
+                  </a:rPr>
+                  <a:t> </a:t>
+                </a:r>
+              </a:p>
+            </p:txBody>
+          </p:sp>
+        </mc:Fallback>
+      </mc:AlternateContent>
+    </p:spTree>
+    <p:extLst>
+      <p:ext uri="{BB962C8B-B14F-4D97-AF65-F5344CB8AC3E}">
+        <p14:creationId xmlns:p14="http://schemas.microsoft.com/office/powerpoint/2010/main" val="4170196153"/>
+      </p:ext>
+    </p:extLst>
+  </p:cSld>
+  <p:clrMapOvr>
+    <a:masterClrMapping/>
+  </p:clrMapOvr>
+</p:sld>
+</file>
+
+<file path=ppt/slides/slide8.xml><?xml version="1.0" encoding="utf-8"?>
+<p:sld xmlns:a="http://schemas.openxmlformats.org/drawingml/2006/main" xmlns:r="http://schemas.openxmlformats.org/officeDocument/2006/relationships" xmlns:p="http://schemas.openxmlformats.org/presentationml/2006/main">
+  <p:cSld>
+    <p:spTree>
+      <p:nvGrpSpPr>
+        <p:cNvPr id="1" name=""/>
+        <p:cNvGrpSpPr/>
+        <p:nvPr/>
+      </p:nvGrpSpPr>
+      <p:grpSpPr>
+        <a:xfrm>
+          <a:off x="0" y="0"/>
+          <a:ext cx="0" cy="0"/>
+          <a:chOff x="0" y="0"/>
+          <a:chExt cx="0" cy="0"/>
+        </a:xfrm>
+      </p:grpSpPr>
+      <p:sp>
+        <p:nvSpPr>
+          <p:cNvPr id="2" name="Title 1">
+            <a:extLst>
+              <a:ext uri="{FF2B5EF4-FFF2-40B4-BE49-F238E27FC236}">
+                <a16:creationId xmlns:a16="http://schemas.microsoft.com/office/drawing/2014/main" id="{F54F4EF0-6254-4645-8AF9-31CD418C7CB9}"/>
+              </a:ext>
+            </a:extLst>
+          </p:cNvPr>
+          <p:cNvSpPr>
+            <a:spLocks noGrp="1"/>
+          </p:cNvSpPr>
+          <p:nvPr>
+            <p:ph type="title"/>
+          </p:nvPr>
+        </p:nvSpPr>
+        <p:spPr/>
+        <p:txBody>
+          <a:bodyPr/>
+          <a:lstStyle/>
+          <a:p>
+            <a:r>
+              <a:rPr lang="en-US" dirty="0"/>
+              <a:t>Quantization</a:t>
+            </a:r>
+          </a:p>
+        </p:txBody>
+      </p:sp>
+      <p:pic>
+        <p:nvPicPr>
+          <p:cNvPr id="5" name="Picture 4">
+            <a:extLst>
+              <a:ext uri="{FF2B5EF4-FFF2-40B4-BE49-F238E27FC236}">
+                <a16:creationId xmlns:a16="http://schemas.microsoft.com/office/drawing/2014/main" id="{D4965245-768D-3A40-9F66-4CB22A212D48}"/>
+              </a:ext>
+            </a:extLst>
+          </p:cNvPr>
+          <p:cNvPicPr>
+            <a:picLocks noChangeAspect="1"/>
+          </p:cNvPicPr>
+          <p:nvPr/>
+        </p:nvPicPr>
+        <p:blipFill>
+          <a:blip r:embed="rId2"/>
+          <a:stretch>
+            <a:fillRect/>
+          </a:stretch>
+        </p:blipFill>
+        <p:spPr>
+          <a:xfrm>
+            <a:off x="6526304" y="3623674"/>
+            <a:ext cx="4994835" cy="2678794"/>
+          </a:xfrm>
+          <a:prstGeom prst="rect">
+            <a:avLst/>
+          </a:prstGeom>
+        </p:spPr>
+      </p:pic>
+      <mc:AlternateContent xmlns:mc="http://schemas.openxmlformats.org/markup-compatibility/2006">
+        <mc:Choice xmlns:a14="http://schemas.microsoft.com/office/drawing/2010/main" Requires="a14">
+          <p:sp>
+            <p:nvSpPr>
+              <p:cNvPr id="3" name="Content Placeholder 2">
+                <a:extLst>
+                  <a:ext uri="{FF2B5EF4-FFF2-40B4-BE49-F238E27FC236}">
+                    <a16:creationId xmlns:a16="http://schemas.microsoft.com/office/drawing/2014/main" id="{BCB6A02F-8A21-DF41-B80C-EEBE4CCEB104}"/>
+                  </a:ext>
+                </a:extLst>
+              </p:cNvPr>
+              <p:cNvSpPr>
+                <a:spLocks noGrp="1"/>
+              </p:cNvSpPr>
+              <p:nvPr>
+                <p:ph idx="1"/>
+              </p:nvPr>
+            </p:nvSpPr>
+            <p:spPr/>
+            <p:txBody>
+              <a:bodyPr/>
+              <a:lstStyle/>
+              <a:p>
+                <a:r>
+                  <a:rPr lang="en-US" dirty="0"/>
+                  <a:t>Human eye perception</a:t>
+                </a:r>
+              </a:p>
+              <a:p>
+                <a:pPr lvl="1"/>
+                <a:r>
+                  <a:rPr lang="en-US" dirty="0"/>
+                  <a:t>Good at difference in brightness</a:t>
+                </a:r>
+              </a:p>
+              <a:p>
+                <a:pPr lvl="1"/>
+                <a:r>
+                  <a:rPr lang="en-US" dirty="0"/>
+                  <a:t>Poor at strength of high frequency brightness variation</a:t>
+                </a:r>
+              </a:p>
+              <a:p>
+                <a:r>
+                  <a:rPr lang="en-US" dirty="0"/>
+                  <a:t>Using a Standard quantization matrix </a:t>
+                </a:r>
+              </a:p>
+              <a:p>
+                <a14:m>
+                  <m:oMath xmlns:m="http://schemas.openxmlformats.org/officeDocument/2006/math">
+                    <m:sSub>
+                      <m:sSubPr>
+                        <m:ctrlPr>
+                          <a:rPr lang="en-US" i="1" smtClean="0">
+                            <a:latin typeface="Cambria Math" panose="02040503050406030204" pitchFamily="18" charset="0"/>
+                          </a:rPr>
+                        </m:ctrlPr>
+                      </m:sSubPr>
+                      <m:e>
+                        <m:r>
+                          <a:rPr lang="en-US" b="0" i="1" smtClean="0">
+                            <a:latin typeface="Cambria Math" panose="02040503050406030204" pitchFamily="18" charset="0"/>
+                          </a:rPr>
+                          <m:t>𝐵</m:t>
+                        </m:r>
+                      </m:e>
+                      <m:sub>
+                        <m:r>
+                          <a:rPr lang="en-US" b="0" i="1" smtClean="0">
+                            <a:latin typeface="Cambria Math" panose="02040503050406030204" pitchFamily="18" charset="0"/>
+                          </a:rPr>
+                          <m:t>𝑗</m:t>
+                        </m:r>
+                        <m:r>
+                          <a:rPr lang="en-US" b="0" i="1" smtClean="0">
+                            <a:latin typeface="Cambria Math" panose="02040503050406030204" pitchFamily="18" charset="0"/>
+                          </a:rPr>
+                          <m:t>,</m:t>
+                        </m:r>
+                        <m:r>
+                          <a:rPr lang="en-US" b="0" i="1" smtClean="0">
+                            <a:latin typeface="Cambria Math" panose="02040503050406030204" pitchFamily="18" charset="0"/>
+                          </a:rPr>
+                          <m:t>𝑘</m:t>
+                        </m:r>
+                      </m:sub>
+                    </m:sSub>
+                    <m:r>
+                      <a:rPr lang="en-US" b="0" i="1" smtClean="0">
+                        <a:latin typeface="Cambria Math" panose="02040503050406030204" pitchFamily="18" charset="0"/>
+                      </a:rPr>
+                      <m:t>=</m:t>
+                    </m:r>
+                    <m:r>
+                      <a:rPr lang="en-US" b="0" i="1" smtClean="0">
+                        <a:latin typeface="Cambria Math" panose="02040503050406030204" pitchFamily="18" charset="0"/>
+                      </a:rPr>
+                      <m:t>𝑟𝑜𝑢𝑛𝑑</m:t>
+                    </m:r>
+                    <m:d>
+                      <m:dPr>
+                        <m:ctrlPr>
+                          <a:rPr lang="en-US" b="0" i="1" smtClean="0">
+                            <a:latin typeface="Cambria Math" panose="02040503050406030204" pitchFamily="18" charset="0"/>
+                          </a:rPr>
+                        </m:ctrlPr>
+                      </m:dPr>
+                      <m:e>
+                        <m:f>
+                          <m:fPr>
+                            <m:ctrlPr>
+                              <a:rPr lang="en-US" b="0" i="1" smtClean="0">
+                                <a:latin typeface="Cambria Math" panose="02040503050406030204" pitchFamily="18" charset="0"/>
+                              </a:rPr>
+                            </m:ctrlPr>
+                          </m:fPr>
+                          <m:num>
+                            <m:sSub>
+                              <m:sSubPr>
+                                <m:ctrlPr>
+                                  <a:rPr lang="en-US" b="0" i="1" smtClean="0">
+                                    <a:latin typeface="Cambria Math" panose="02040503050406030204" pitchFamily="18" charset="0"/>
+                                  </a:rPr>
+                                </m:ctrlPr>
+                              </m:sSubPr>
+                              <m:e>
+                                <m:r>
+                                  <a:rPr lang="en-US" b="0" i="1" smtClean="0">
+                                    <a:latin typeface="Cambria Math" panose="02040503050406030204" pitchFamily="18" charset="0"/>
+                                  </a:rPr>
+                                  <m:t>𝐺</m:t>
+                                </m:r>
+                              </m:e>
+                              <m:sub>
+                                <m:r>
+                                  <a:rPr lang="en-US" b="0" i="1" smtClean="0">
+                                    <a:latin typeface="Cambria Math" panose="02040503050406030204" pitchFamily="18" charset="0"/>
+                                  </a:rPr>
+                                  <m:t>𝑗</m:t>
+                                </m:r>
+                                <m:r>
+                                  <a:rPr lang="en-US" b="0" i="1" smtClean="0">
+                                    <a:latin typeface="Cambria Math" panose="02040503050406030204" pitchFamily="18" charset="0"/>
+                                  </a:rPr>
+                                  <m:t>,</m:t>
+                                </m:r>
+                                <m:r>
+                                  <a:rPr lang="en-US" b="0" i="1" smtClean="0">
+                                    <a:latin typeface="Cambria Math" panose="02040503050406030204" pitchFamily="18" charset="0"/>
+                                  </a:rPr>
+                                  <m:t>𝑘</m:t>
+                                </m:r>
+                              </m:sub>
+                            </m:sSub>
+                          </m:num>
+                          <m:den>
+                            <m:sSub>
+                              <m:sSubPr>
+                                <m:ctrlPr>
+                                  <a:rPr lang="en-US" b="0" i="1" smtClean="0">
+                                    <a:latin typeface="Cambria Math" panose="02040503050406030204" pitchFamily="18" charset="0"/>
+                                  </a:rPr>
+                                </m:ctrlPr>
+                              </m:sSubPr>
+                              <m:e>
+                                <m:r>
+                                  <a:rPr lang="en-US" b="0" i="1" smtClean="0">
+                                    <a:latin typeface="Cambria Math" panose="02040503050406030204" pitchFamily="18" charset="0"/>
+                                  </a:rPr>
+                                  <m:t>𝑄</m:t>
+                                </m:r>
+                              </m:e>
+                              <m:sub>
+                                <m:r>
+                                  <a:rPr lang="en-US" b="0" i="1" smtClean="0">
+                                    <a:latin typeface="Cambria Math" panose="02040503050406030204" pitchFamily="18" charset="0"/>
+                                  </a:rPr>
+                                  <m:t>𝑗</m:t>
+                                </m:r>
+                                <m:r>
+                                  <a:rPr lang="en-US" b="0" i="1" smtClean="0">
+                                    <a:latin typeface="Cambria Math" panose="02040503050406030204" pitchFamily="18" charset="0"/>
+                                  </a:rPr>
+                                  <m:t>,</m:t>
+                                </m:r>
+                                <m:r>
+                                  <a:rPr lang="en-US" b="0" i="1" smtClean="0">
+                                    <a:latin typeface="Cambria Math" panose="02040503050406030204" pitchFamily="18" charset="0"/>
+                                  </a:rPr>
+                                  <m:t>𝑘</m:t>
+                                </m:r>
+                              </m:sub>
+                            </m:sSub>
+                          </m:den>
+                        </m:f>
+                      </m:e>
+                    </m:d>
+                  </m:oMath>
+                </a14:m>
+                <a:endParaRPr lang="en-US" dirty="0"/>
+              </a:p>
+            </p:txBody>
+          </p:sp>
+        </mc:Choice>
+        <mc:Fallback>
+          <p:sp>
+            <p:nvSpPr>
+              <p:cNvPr id="3" name="Content Placeholder 2">
+                <a:extLst>
+                  <a:ext uri="{FF2B5EF4-FFF2-40B4-BE49-F238E27FC236}">
+                    <a16:creationId xmlns:a16="http://schemas.microsoft.com/office/drawing/2014/main" id="{BCB6A02F-8A21-DF41-B80C-EEBE4CCEB104}"/>
+                  </a:ext>
+                </a:extLst>
+              </p:cNvPr>
+              <p:cNvSpPr>
+                <a:spLocks noGrp="1" noRot="1" noChangeAspect="1" noMove="1" noResize="1" noEditPoints="1" noAdjustHandles="1" noChangeArrowheads="1" noChangeShapeType="1" noTextEdit="1"/>
+              </p:cNvSpPr>
+              <p:nvPr>
+                <p:ph idx="1"/>
+              </p:nvPr>
+            </p:nvSpPr>
+            <p:spPr>
+              <a:blipFill>
+                <a:blip r:embed="rId3"/>
+                <a:stretch>
+                  <a:fillRect l="-965" t="-2632"/>
+                </a:stretch>
+              </a:blipFill>
+            </p:spPr>
+            <p:txBody>
+              <a:bodyPr/>
+              <a:lstStyle/>
+              <a:p>
+                <a:r>
+                  <a:rPr lang="en-US">
+                    <a:noFill/>
+                  </a:rPr>
+                  <a:t> </a:t>
+                </a:r>
+              </a:p>
+            </p:txBody>
+          </p:sp>
+        </mc:Fallback>
+      </mc:AlternateContent>
+    </p:spTree>
+    <p:extLst>
+      <p:ext uri="{BB962C8B-B14F-4D97-AF65-F5344CB8AC3E}">
+        <p14:creationId xmlns:p14="http://schemas.microsoft.com/office/powerpoint/2010/main" val="3786955607"/>
+      </p:ext>
+    </p:extLst>
+  </p:cSld>
+  <p:clrMapOvr>
+    <a:masterClrMapping/>
+  </p:clrMapOvr>
+</p:sld>
+</file>
+
+<file path=ppt/slides/slide9.xml><?xml version="1.0" encoding="utf-8"?>
+<p:sld xmlns:a="http://schemas.openxmlformats.org/drawingml/2006/main" xmlns:r="http://schemas.openxmlformats.org/officeDocument/2006/relationships" xmlns:p="http://schemas.openxmlformats.org/presentationml/2006/main">
+  <p:cSld>
+    <p:spTree>
+      <p:nvGrpSpPr>
+        <p:cNvPr id="1" name=""/>
+        <p:cNvGrpSpPr/>
+        <p:nvPr/>
+      </p:nvGrpSpPr>
+      <p:grpSpPr>
+        <a:xfrm>
+          <a:off x="0" y="0"/>
+          <a:ext cx="0" cy="0"/>
+          <a:chOff x="0" y="0"/>
+          <a:chExt cx="0" cy="0"/>
+        </a:xfrm>
+      </p:grpSpPr>
+      <p:sp>
+        <p:nvSpPr>
+          <p:cNvPr id="2" name="Title 1">
+            <a:extLst>
+              <a:ext uri="{FF2B5EF4-FFF2-40B4-BE49-F238E27FC236}">
+                <a16:creationId xmlns:a16="http://schemas.microsoft.com/office/drawing/2014/main" id="{EE612753-E33E-6540-99F0-82998EE32302}"/>
+              </a:ext>
+            </a:extLst>
+          </p:cNvPr>
+          <p:cNvSpPr>
+            <a:spLocks noGrp="1"/>
+          </p:cNvSpPr>
+          <p:nvPr>
+            <p:ph type="title"/>
+          </p:nvPr>
+        </p:nvSpPr>
+        <p:spPr/>
+        <p:txBody>
+          <a:bodyPr/>
+          <a:lstStyle/>
+          <a:p>
+            <a:r>
+              <a:rPr lang="en-US" dirty="0"/>
+              <a:t>Entropy Encoding</a:t>
+            </a:r>
+          </a:p>
+        </p:txBody>
+      </p:sp>
+      <p:sp>
+        <p:nvSpPr>
+          <p:cNvPr id="3" name="Content Placeholder 2">
+            <a:extLst>
+              <a:ext uri="{FF2B5EF4-FFF2-40B4-BE49-F238E27FC236}">
+                <a16:creationId xmlns:a16="http://schemas.microsoft.com/office/drawing/2014/main" id="{B5D0EE15-E940-2B40-8561-641C42761072}"/>
+              </a:ext>
+            </a:extLst>
+          </p:cNvPr>
+          <p:cNvSpPr>
+            <a:spLocks noGrp="1"/>
+          </p:cNvSpPr>
+          <p:nvPr>
+            <p:ph idx="1"/>
+          </p:nvPr>
+        </p:nvSpPr>
+        <p:spPr/>
+        <p:txBody>
+          <a:bodyPr/>
+          <a:lstStyle/>
+          <a:p>
+            <a:r>
+              <a:rPr lang="en-US" dirty="0"/>
+              <a:t>Lossless data compression</a:t>
+            </a:r>
+          </a:p>
+          <a:p>
+            <a:r>
+              <a:rPr lang="en-US" dirty="0"/>
+              <a:t>Zigzag:</a:t>
+            </a:r>
+          </a:p>
+          <a:p>
+            <a:r>
+              <a:rPr lang="en-US" dirty="0"/>
+              <a:t>Run Length Encoding:</a:t>
+            </a:r>
+          </a:p>
+        </p:txBody>
+      </p:sp>
+    </p:spTree>
+    <p:extLst>
+      <p:ext uri="{BB962C8B-B14F-4D97-AF65-F5344CB8AC3E}">
+        <p14:creationId xmlns:p14="http://schemas.microsoft.com/office/powerpoint/2010/main" val="2621006827"/>
       </p:ext>
     </p:extLst>
   </p:cSld>

</xml_diff>